<commit_message>
added comments to the slides
</commit_message>
<xml_diff>
--- a/20180927/Stick to the full potential of PowerShell/Stick to the full potential of PowerShell.pptx
+++ b/20180927/Stick to the full potential of PowerShell/Stick to the full potential of PowerShell.pptx
@@ -5,6 +5,9 @@
     <p:sldMasterId id="2147483648" r:id="rId1"/>
     <p:sldMasterId id="2147483660" r:id="rId2"/>
   </p:sldMasterIdLst>
+  <p:notesMasterIdLst>
+    <p:notesMasterId r:id="rId12"/>
+  </p:notesMasterIdLst>
   <p:sldIdLst>
     <p:sldId id="257" r:id="rId3"/>
     <p:sldId id="256" r:id="rId4"/>
@@ -119,6 +122,3563 @@
     </p:ext>
   </p:extLst>
 </p:presentation>
+</file>
+
+<file path=ppt/notesMasters/notesMaster1.xml><?xml version="1.0" encoding="utf-8"?>
+<p:notesMaster xmlns:a="http://schemas.openxmlformats.org/drawingml/2006/main" xmlns:r="http://schemas.openxmlformats.org/officeDocument/2006/relationships" xmlns:p="http://schemas.openxmlformats.org/presentationml/2006/main">
+  <p:cSld>
+    <p:bg>
+      <p:bgRef idx="1001">
+        <a:schemeClr val="bg1"/>
+      </p:bgRef>
+    </p:bg>
+    <p:spTree>
+      <p:nvGrpSpPr>
+        <p:cNvPr id="1" name=""/>
+        <p:cNvGrpSpPr/>
+        <p:nvPr/>
+      </p:nvGrpSpPr>
+      <p:grpSpPr>
+        <a:xfrm>
+          <a:off x="0" y="0"/>
+          <a:ext cx="0" cy="0"/>
+          <a:chOff x="0" y="0"/>
+          <a:chExt cx="0" cy="0"/>
+        </a:xfrm>
+      </p:grpSpPr>
+      <p:sp>
+        <p:nvSpPr>
+          <p:cNvPr id="2" name="Header Placeholder 1"/>
+          <p:cNvSpPr>
+            <a:spLocks noGrp="1"/>
+          </p:cNvSpPr>
+          <p:nvPr>
+            <p:ph type="hdr" sz="quarter"/>
+          </p:nvPr>
+        </p:nvSpPr>
+        <p:spPr>
+          <a:xfrm>
+            <a:off x="0" y="0"/>
+            <a:ext cx="2971800" cy="458788"/>
+          </a:xfrm>
+          <a:prstGeom prst="rect">
+            <a:avLst/>
+          </a:prstGeom>
+        </p:spPr>
+        <p:txBody>
+          <a:bodyPr vert="horz" lIns="91440" tIns="45720" rIns="91440" bIns="45720" rtlCol="0"/>
+          <a:lstStyle>
+            <a:lvl1pPr algn="l">
+              <a:defRPr sz="1200"/>
+            </a:lvl1pPr>
+          </a:lstStyle>
+          <a:p>
+            <a:endParaRPr lang="nl-BE"/>
+          </a:p>
+        </p:txBody>
+      </p:sp>
+      <p:sp>
+        <p:nvSpPr>
+          <p:cNvPr id="3" name="Date Placeholder 2"/>
+          <p:cNvSpPr>
+            <a:spLocks noGrp="1"/>
+          </p:cNvSpPr>
+          <p:nvPr>
+            <p:ph type="dt" idx="1"/>
+          </p:nvPr>
+        </p:nvSpPr>
+        <p:spPr>
+          <a:xfrm>
+            <a:off x="3884613" y="0"/>
+            <a:ext cx="2971800" cy="458788"/>
+          </a:xfrm>
+          <a:prstGeom prst="rect">
+            <a:avLst/>
+          </a:prstGeom>
+        </p:spPr>
+        <p:txBody>
+          <a:bodyPr vert="horz" lIns="91440" tIns="45720" rIns="91440" bIns="45720" rtlCol="0"/>
+          <a:lstStyle>
+            <a:lvl1pPr algn="r">
+              <a:defRPr sz="1200"/>
+            </a:lvl1pPr>
+          </a:lstStyle>
+          <a:p>
+            <a:fld id="{C859A232-88F2-4C91-9315-890CF000A76F}" type="datetimeFigureOut">
+              <a:rPr lang="nl-BE" smtClean="0"/>
+              <a:t>25/09/2018</a:t>
+            </a:fld>
+            <a:endParaRPr lang="nl-BE"/>
+          </a:p>
+        </p:txBody>
+      </p:sp>
+      <p:sp>
+        <p:nvSpPr>
+          <p:cNvPr id="4" name="Slide Image Placeholder 3"/>
+          <p:cNvSpPr>
+            <a:spLocks noGrp="1" noRot="1" noChangeAspect="1"/>
+          </p:cNvSpPr>
+          <p:nvPr>
+            <p:ph type="sldImg" idx="2"/>
+          </p:nvPr>
+        </p:nvSpPr>
+        <p:spPr>
+          <a:xfrm>
+            <a:off x="685800" y="1143000"/>
+            <a:ext cx="5486400" cy="3086100"/>
+          </a:xfrm>
+          <a:prstGeom prst="rect">
+            <a:avLst/>
+          </a:prstGeom>
+          <a:noFill/>
+          <a:ln w="12700">
+            <a:solidFill>
+              <a:prstClr val="black"/>
+            </a:solidFill>
+          </a:ln>
+        </p:spPr>
+        <p:txBody>
+          <a:bodyPr vert="horz" lIns="91440" tIns="45720" rIns="91440" bIns="45720" rtlCol="0" anchor="ctr"/>
+          <a:lstStyle/>
+          <a:p>
+            <a:endParaRPr lang="nl-BE"/>
+          </a:p>
+        </p:txBody>
+      </p:sp>
+      <p:sp>
+        <p:nvSpPr>
+          <p:cNvPr id="5" name="Notes Placeholder 4"/>
+          <p:cNvSpPr>
+            <a:spLocks noGrp="1"/>
+          </p:cNvSpPr>
+          <p:nvPr>
+            <p:ph type="body" sz="quarter" idx="3"/>
+          </p:nvPr>
+        </p:nvSpPr>
+        <p:spPr>
+          <a:xfrm>
+            <a:off x="685800" y="4400550"/>
+            <a:ext cx="5486400" cy="3600450"/>
+          </a:xfrm>
+          <a:prstGeom prst="rect">
+            <a:avLst/>
+          </a:prstGeom>
+        </p:spPr>
+        <p:txBody>
+          <a:bodyPr vert="horz" lIns="91440" tIns="45720" rIns="91440" bIns="45720" rtlCol="0"/>
+          <a:lstStyle/>
+          <a:p>
+            <a:pPr lvl="0"/>
+            <a:r>
+              <a:rPr lang="en-US"/>
+              <a:t>Edit Master text styles</a:t>
+            </a:r>
+          </a:p>
+          <a:p>
+            <a:pPr lvl="1"/>
+            <a:r>
+              <a:rPr lang="en-US"/>
+              <a:t>Second level</a:t>
+            </a:r>
+          </a:p>
+          <a:p>
+            <a:pPr lvl="2"/>
+            <a:r>
+              <a:rPr lang="en-US"/>
+              <a:t>Third level</a:t>
+            </a:r>
+          </a:p>
+          <a:p>
+            <a:pPr lvl="3"/>
+            <a:r>
+              <a:rPr lang="en-US"/>
+              <a:t>Fourth level</a:t>
+            </a:r>
+          </a:p>
+          <a:p>
+            <a:pPr lvl="4"/>
+            <a:r>
+              <a:rPr lang="en-US"/>
+              <a:t>Fifth level</a:t>
+            </a:r>
+            <a:endParaRPr lang="nl-BE"/>
+          </a:p>
+        </p:txBody>
+      </p:sp>
+      <p:sp>
+        <p:nvSpPr>
+          <p:cNvPr id="6" name="Footer Placeholder 5"/>
+          <p:cNvSpPr>
+            <a:spLocks noGrp="1"/>
+          </p:cNvSpPr>
+          <p:nvPr>
+            <p:ph type="ftr" sz="quarter" idx="4"/>
+          </p:nvPr>
+        </p:nvSpPr>
+        <p:spPr>
+          <a:xfrm>
+            <a:off x="0" y="8685213"/>
+            <a:ext cx="2971800" cy="458787"/>
+          </a:xfrm>
+          <a:prstGeom prst="rect">
+            <a:avLst/>
+          </a:prstGeom>
+        </p:spPr>
+        <p:txBody>
+          <a:bodyPr vert="horz" lIns="91440" tIns="45720" rIns="91440" bIns="45720" rtlCol="0" anchor="b"/>
+          <a:lstStyle>
+            <a:lvl1pPr algn="l">
+              <a:defRPr sz="1200"/>
+            </a:lvl1pPr>
+          </a:lstStyle>
+          <a:p>
+            <a:endParaRPr lang="nl-BE"/>
+          </a:p>
+        </p:txBody>
+      </p:sp>
+      <p:sp>
+        <p:nvSpPr>
+          <p:cNvPr id="7" name="Slide Number Placeholder 6"/>
+          <p:cNvSpPr>
+            <a:spLocks noGrp="1"/>
+          </p:cNvSpPr>
+          <p:nvPr>
+            <p:ph type="sldNum" sz="quarter" idx="5"/>
+          </p:nvPr>
+        </p:nvSpPr>
+        <p:spPr>
+          <a:xfrm>
+            <a:off x="3884613" y="8685213"/>
+            <a:ext cx="2971800" cy="458787"/>
+          </a:xfrm>
+          <a:prstGeom prst="rect">
+            <a:avLst/>
+          </a:prstGeom>
+        </p:spPr>
+        <p:txBody>
+          <a:bodyPr vert="horz" lIns="91440" tIns="45720" rIns="91440" bIns="45720" rtlCol="0" anchor="b"/>
+          <a:lstStyle>
+            <a:lvl1pPr algn="r">
+              <a:defRPr sz="1200"/>
+            </a:lvl1pPr>
+          </a:lstStyle>
+          <a:p>
+            <a:fld id="{4F5D4D40-D039-4272-86AA-C36A8296572F}" type="slidenum">
+              <a:rPr lang="nl-BE" smtClean="0"/>
+              <a:t>‹#›</a:t>
+            </a:fld>
+            <a:endParaRPr lang="nl-BE"/>
+          </a:p>
+        </p:txBody>
+      </p:sp>
+    </p:spTree>
+    <p:extLst>
+      <p:ext uri="{BB962C8B-B14F-4D97-AF65-F5344CB8AC3E}">
+        <p14:creationId xmlns:p14="http://schemas.microsoft.com/office/powerpoint/2010/main" val="381525059"/>
+      </p:ext>
+    </p:extLst>
+  </p:cSld>
+  <p:clrMap bg1="lt1" tx1="dk1" bg2="lt2" tx2="dk2" accent1="accent1" accent2="accent2" accent3="accent3" accent4="accent4" accent5="accent5" accent6="accent6" hlink="hlink" folHlink="folHlink"/>
+  <p:notesStyle>
+    <a:lvl1pPr marL="0" algn="l" defTabSz="914400" rtl="0" eaLnBrk="1" latinLnBrk="0" hangingPunct="1">
+      <a:defRPr sz="1200" kern="1200">
+        <a:solidFill>
+          <a:schemeClr val="tx1"/>
+        </a:solidFill>
+        <a:latin typeface="+mn-lt"/>
+        <a:ea typeface="+mn-ea"/>
+        <a:cs typeface="+mn-cs"/>
+      </a:defRPr>
+    </a:lvl1pPr>
+    <a:lvl2pPr marL="457200" algn="l" defTabSz="914400" rtl="0" eaLnBrk="1" latinLnBrk="0" hangingPunct="1">
+      <a:defRPr sz="1200" kern="1200">
+        <a:solidFill>
+          <a:schemeClr val="tx1"/>
+        </a:solidFill>
+        <a:latin typeface="+mn-lt"/>
+        <a:ea typeface="+mn-ea"/>
+        <a:cs typeface="+mn-cs"/>
+      </a:defRPr>
+    </a:lvl2pPr>
+    <a:lvl3pPr marL="914400" algn="l" defTabSz="914400" rtl="0" eaLnBrk="1" latinLnBrk="0" hangingPunct="1">
+      <a:defRPr sz="1200" kern="1200">
+        <a:solidFill>
+          <a:schemeClr val="tx1"/>
+        </a:solidFill>
+        <a:latin typeface="+mn-lt"/>
+        <a:ea typeface="+mn-ea"/>
+        <a:cs typeface="+mn-cs"/>
+      </a:defRPr>
+    </a:lvl3pPr>
+    <a:lvl4pPr marL="1371600" algn="l" defTabSz="914400" rtl="0" eaLnBrk="1" latinLnBrk="0" hangingPunct="1">
+      <a:defRPr sz="1200" kern="1200">
+        <a:solidFill>
+          <a:schemeClr val="tx1"/>
+        </a:solidFill>
+        <a:latin typeface="+mn-lt"/>
+        <a:ea typeface="+mn-ea"/>
+        <a:cs typeface="+mn-cs"/>
+      </a:defRPr>
+    </a:lvl4pPr>
+    <a:lvl5pPr marL="1828800" algn="l" defTabSz="914400" rtl="0" eaLnBrk="1" latinLnBrk="0" hangingPunct="1">
+      <a:defRPr sz="1200" kern="1200">
+        <a:solidFill>
+          <a:schemeClr val="tx1"/>
+        </a:solidFill>
+        <a:latin typeface="+mn-lt"/>
+        <a:ea typeface="+mn-ea"/>
+        <a:cs typeface="+mn-cs"/>
+      </a:defRPr>
+    </a:lvl5pPr>
+    <a:lvl6pPr marL="2286000" algn="l" defTabSz="914400" rtl="0" eaLnBrk="1" latinLnBrk="0" hangingPunct="1">
+      <a:defRPr sz="1200" kern="1200">
+        <a:solidFill>
+          <a:schemeClr val="tx1"/>
+        </a:solidFill>
+        <a:latin typeface="+mn-lt"/>
+        <a:ea typeface="+mn-ea"/>
+        <a:cs typeface="+mn-cs"/>
+      </a:defRPr>
+    </a:lvl6pPr>
+    <a:lvl7pPr marL="2743200" algn="l" defTabSz="914400" rtl="0" eaLnBrk="1" latinLnBrk="0" hangingPunct="1">
+      <a:defRPr sz="1200" kern="1200">
+        <a:solidFill>
+          <a:schemeClr val="tx1"/>
+        </a:solidFill>
+        <a:latin typeface="+mn-lt"/>
+        <a:ea typeface="+mn-ea"/>
+        <a:cs typeface="+mn-cs"/>
+      </a:defRPr>
+    </a:lvl7pPr>
+    <a:lvl8pPr marL="3200400" algn="l" defTabSz="914400" rtl="0" eaLnBrk="1" latinLnBrk="0" hangingPunct="1">
+      <a:defRPr sz="1200" kern="1200">
+        <a:solidFill>
+          <a:schemeClr val="tx1"/>
+        </a:solidFill>
+        <a:latin typeface="+mn-lt"/>
+        <a:ea typeface="+mn-ea"/>
+        <a:cs typeface="+mn-cs"/>
+      </a:defRPr>
+    </a:lvl8pPr>
+    <a:lvl9pPr marL="3657600" algn="l" defTabSz="914400" rtl="0" eaLnBrk="1" latinLnBrk="0" hangingPunct="1">
+      <a:defRPr sz="1200" kern="1200">
+        <a:solidFill>
+          <a:schemeClr val="tx1"/>
+        </a:solidFill>
+        <a:latin typeface="+mn-lt"/>
+        <a:ea typeface="+mn-ea"/>
+        <a:cs typeface="+mn-cs"/>
+      </a:defRPr>
+    </a:lvl9pPr>
+  </p:notesStyle>
+</p:notesMaster>
+</file>
+
+<file path=ppt/notesSlides/notesSlide1.xml><?xml version="1.0" encoding="utf-8"?>
+<p:notes xmlns:a="http://schemas.openxmlformats.org/drawingml/2006/main" xmlns:r="http://schemas.openxmlformats.org/officeDocument/2006/relationships" xmlns:p="http://schemas.openxmlformats.org/presentationml/2006/main">
+  <p:cSld>
+    <p:spTree>
+      <p:nvGrpSpPr>
+        <p:cNvPr id="1" name=""/>
+        <p:cNvGrpSpPr/>
+        <p:nvPr/>
+      </p:nvGrpSpPr>
+      <p:grpSpPr>
+        <a:xfrm>
+          <a:off x="0" y="0"/>
+          <a:ext cx="0" cy="0"/>
+          <a:chOff x="0" y="0"/>
+          <a:chExt cx="0" cy="0"/>
+        </a:xfrm>
+      </p:grpSpPr>
+      <p:sp>
+        <p:nvSpPr>
+          <p:cNvPr id="2" name="Slide Image Placeholder 1"/>
+          <p:cNvSpPr>
+            <a:spLocks noGrp="1" noRot="1" noChangeAspect="1"/>
+          </p:cNvSpPr>
+          <p:nvPr>
+            <p:ph type="sldImg"/>
+          </p:nvPr>
+        </p:nvSpPr>
+        <p:spPr/>
+      </p:sp>
+      <p:sp>
+        <p:nvSpPr>
+          <p:cNvPr id="3" name="Notes Placeholder 2"/>
+          <p:cNvSpPr>
+            <a:spLocks noGrp="1"/>
+          </p:cNvSpPr>
+          <p:nvPr>
+            <p:ph type="body" idx="1"/>
+          </p:nvPr>
+        </p:nvSpPr>
+        <p:spPr/>
+        <p:txBody>
+          <a:bodyPr/>
+          <a:lstStyle/>
+          <a:p>
+            <a:r>
+              <a:rPr lang="nl-BE" dirty="0" err="1"/>
+              <a:t>Good</a:t>
+            </a:r>
+            <a:r>
+              <a:rPr lang="nl-BE" dirty="0"/>
+              <a:t> evening </a:t>
+            </a:r>
+            <a:r>
+              <a:rPr lang="nl-BE" dirty="0" err="1"/>
+              <a:t>and</a:t>
+            </a:r>
+            <a:r>
+              <a:rPr lang="nl-BE" dirty="0"/>
+              <a:t> </a:t>
+            </a:r>
+            <a:r>
+              <a:rPr lang="nl-BE" dirty="0" err="1"/>
+              <a:t>thank</a:t>
+            </a:r>
+            <a:r>
+              <a:rPr lang="nl-BE" dirty="0"/>
+              <a:t> </a:t>
+            </a:r>
+            <a:r>
+              <a:rPr lang="nl-BE" dirty="0" err="1"/>
+              <a:t>you</a:t>
+            </a:r>
+            <a:r>
+              <a:rPr lang="nl-BE" dirty="0"/>
+              <a:t> </a:t>
+            </a:r>
+            <a:r>
+              <a:rPr lang="nl-BE" dirty="0" err="1"/>
+              <a:t>for</a:t>
+            </a:r>
+            <a:r>
+              <a:rPr lang="nl-BE" dirty="0"/>
+              <a:t> </a:t>
+            </a:r>
+            <a:r>
+              <a:rPr lang="nl-BE" dirty="0" err="1"/>
+              <a:t>visiting</a:t>
+            </a:r>
+            <a:r>
+              <a:rPr lang="nl-BE" dirty="0"/>
+              <a:t> Xylos </a:t>
+            </a:r>
+            <a:r>
+              <a:rPr lang="nl-BE" dirty="0" err="1"/>
+              <a:t>tonight</a:t>
+            </a:r>
+            <a:r>
+              <a:rPr lang="nl-BE" dirty="0"/>
+              <a:t>.</a:t>
+            </a:r>
+          </a:p>
+          <a:p>
+            <a:endParaRPr lang="nl-BE" dirty="0"/>
+          </a:p>
+          <a:p>
+            <a:r>
+              <a:rPr lang="nl-BE" dirty="0"/>
+              <a:t>I </a:t>
+            </a:r>
+            <a:r>
+              <a:rPr lang="nl-BE" dirty="0" err="1"/>
+              <a:t>would</a:t>
+            </a:r>
+            <a:r>
+              <a:rPr lang="nl-BE" dirty="0"/>
+              <a:t> like </a:t>
+            </a:r>
+            <a:r>
+              <a:rPr lang="nl-BE" dirty="0" err="1"/>
+              <a:t>to</a:t>
+            </a:r>
+            <a:r>
+              <a:rPr lang="nl-BE" dirty="0"/>
+              <a:t> talk </a:t>
+            </a:r>
+            <a:r>
+              <a:rPr lang="nl-BE" dirty="0" err="1"/>
+              <a:t>to</a:t>
+            </a:r>
+            <a:r>
+              <a:rPr lang="nl-BE" dirty="0"/>
+              <a:t> </a:t>
+            </a:r>
+            <a:r>
+              <a:rPr lang="nl-BE" dirty="0" err="1"/>
+              <a:t>you</a:t>
+            </a:r>
+            <a:r>
+              <a:rPr lang="nl-BE" dirty="0"/>
+              <a:t> </a:t>
+            </a:r>
+            <a:r>
+              <a:rPr lang="nl-BE" dirty="0" err="1"/>
+              <a:t>about</a:t>
+            </a:r>
+            <a:r>
+              <a:rPr lang="nl-BE" dirty="0"/>
+              <a:t> a scenario </a:t>
+            </a:r>
+            <a:r>
+              <a:rPr lang="nl-BE" dirty="0" err="1"/>
+              <a:t>where</a:t>
+            </a:r>
+            <a:r>
+              <a:rPr lang="nl-BE" dirty="0"/>
+              <a:t> </a:t>
+            </a:r>
+            <a:r>
+              <a:rPr lang="nl-BE" dirty="0" err="1"/>
+              <a:t>PowerShell</a:t>
+            </a:r>
+            <a:r>
+              <a:rPr lang="nl-BE" dirty="0"/>
+              <a:t> </a:t>
+            </a:r>
+            <a:r>
+              <a:rPr lang="nl-BE" dirty="0" err="1"/>
+              <a:t>wasn’t</a:t>
+            </a:r>
+            <a:r>
+              <a:rPr lang="nl-BE" dirty="0"/>
+              <a:t> </a:t>
+            </a:r>
+            <a:r>
+              <a:rPr lang="nl-BE" dirty="0" err="1"/>
+              <a:t>the</a:t>
+            </a:r>
+            <a:r>
+              <a:rPr lang="nl-BE" dirty="0"/>
+              <a:t> best tool </a:t>
+            </a:r>
+            <a:r>
+              <a:rPr lang="nl-BE" dirty="0" err="1"/>
+              <a:t>to</a:t>
+            </a:r>
+            <a:r>
+              <a:rPr lang="nl-BE" dirty="0"/>
+              <a:t> </a:t>
+            </a:r>
+            <a:r>
+              <a:rPr lang="nl-BE" dirty="0" err="1"/>
+              <a:t>use</a:t>
+            </a:r>
+            <a:r>
+              <a:rPr lang="nl-BE" dirty="0"/>
+              <a:t> on </a:t>
+            </a:r>
+            <a:r>
+              <a:rPr lang="nl-BE" dirty="0" err="1"/>
+              <a:t>its</a:t>
+            </a:r>
+            <a:r>
+              <a:rPr lang="nl-BE" dirty="0"/>
+              <a:t> </a:t>
+            </a:r>
+            <a:r>
+              <a:rPr lang="nl-BE" dirty="0" err="1"/>
+              <a:t>own</a:t>
+            </a:r>
+            <a:r>
+              <a:rPr lang="nl-BE" dirty="0"/>
+              <a:t>, but in </a:t>
+            </a:r>
+            <a:r>
+              <a:rPr lang="nl-BE" dirty="0" err="1"/>
+              <a:t>conjunction</a:t>
+            </a:r>
+            <a:r>
+              <a:rPr lang="nl-BE" dirty="0"/>
+              <a:t> </a:t>
+            </a:r>
+            <a:r>
+              <a:rPr lang="nl-BE" dirty="0" err="1"/>
+              <a:t>with</a:t>
+            </a:r>
+            <a:r>
+              <a:rPr lang="nl-BE" dirty="0"/>
+              <a:t> </a:t>
+            </a:r>
+            <a:r>
+              <a:rPr lang="nl-BE" dirty="0" err="1"/>
+              <a:t>other</a:t>
+            </a:r>
+            <a:r>
+              <a:rPr lang="nl-BE" dirty="0"/>
+              <a:t> tools, </a:t>
+            </a:r>
+            <a:r>
+              <a:rPr lang="nl-BE" dirty="0" err="1"/>
+              <a:t>delivered</a:t>
+            </a:r>
+            <a:r>
+              <a:rPr lang="nl-BE" dirty="0"/>
+              <a:t> </a:t>
+            </a:r>
+            <a:r>
+              <a:rPr lang="nl-BE" dirty="0" err="1"/>
+              <a:t>the</a:t>
+            </a:r>
+            <a:r>
+              <a:rPr lang="nl-BE" dirty="0"/>
+              <a:t> best solution </a:t>
+            </a:r>
+            <a:r>
+              <a:rPr lang="nl-BE" dirty="0" err="1"/>
+              <a:t>to</a:t>
+            </a:r>
+            <a:r>
+              <a:rPr lang="nl-BE" dirty="0"/>
+              <a:t> match </a:t>
+            </a:r>
+            <a:r>
+              <a:rPr lang="nl-BE" dirty="0" err="1"/>
+              <a:t>the</a:t>
+            </a:r>
+            <a:r>
+              <a:rPr lang="nl-BE" dirty="0"/>
+              <a:t> </a:t>
+            </a:r>
+            <a:r>
+              <a:rPr lang="nl-BE" dirty="0" err="1"/>
+              <a:t>request</a:t>
+            </a:r>
+            <a:r>
+              <a:rPr lang="nl-BE" dirty="0"/>
+              <a:t> of </a:t>
+            </a:r>
+            <a:r>
+              <a:rPr lang="nl-BE" dirty="0" err="1"/>
+              <a:t>the</a:t>
+            </a:r>
+            <a:r>
+              <a:rPr lang="nl-BE" dirty="0"/>
+              <a:t> customer.</a:t>
+            </a:r>
+          </a:p>
+        </p:txBody>
+      </p:sp>
+      <p:sp>
+        <p:nvSpPr>
+          <p:cNvPr id="4" name="Slide Number Placeholder 3"/>
+          <p:cNvSpPr>
+            <a:spLocks noGrp="1"/>
+          </p:cNvSpPr>
+          <p:nvPr>
+            <p:ph type="sldNum" sz="quarter" idx="5"/>
+          </p:nvPr>
+        </p:nvSpPr>
+        <p:spPr/>
+        <p:txBody>
+          <a:bodyPr/>
+          <a:lstStyle/>
+          <a:p>
+            <a:fld id="{4F5D4D40-D039-4272-86AA-C36A8296572F}" type="slidenum">
+              <a:rPr lang="nl-BE" smtClean="0"/>
+              <a:t>1</a:t>
+            </a:fld>
+            <a:endParaRPr lang="nl-BE"/>
+          </a:p>
+        </p:txBody>
+      </p:sp>
+    </p:spTree>
+    <p:extLst>
+      <p:ext uri="{BB962C8B-B14F-4D97-AF65-F5344CB8AC3E}">
+        <p14:creationId xmlns:p14="http://schemas.microsoft.com/office/powerpoint/2010/main" val="436165168"/>
+      </p:ext>
+    </p:extLst>
+  </p:cSld>
+  <p:clrMapOvr>
+    <a:masterClrMapping/>
+  </p:clrMapOvr>
+</p:notes>
+</file>
+
+<file path=ppt/notesSlides/notesSlide2.xml><?xml version="1.0" encoding="utf-8"?>
+<p:notes xmlns:a="http://schemas.openxmlformats.org/drawingml/2006/main" xmlns:r="http://schemas.openxmlformats.org/officeDocument/2006/relationships" xmlns:p="http://schemas.openxmlformats.org/presentationml/2006/main">
+  <p:cSld>
+    <p:spTree>
+      <p:nvGrpSpPr>
+        <p:cNvPr id="1" name=""/>
+        <p:cNvGrpSpPr/>
+        <p:nvPr/>
+      </p:nvGrpSpPr>
+      <p:grpSpPr>
+        <a:xfrm>
+          <a:off x="0" y="0"/>
+          <a:ext cx="0" cy="0"/>
+          <a:chOff x="0" y="0"/>
+          <a:chExt cx="0" cy="0"/>
+        </a:xfrm>
+      </p:grpSpPr>
+      <p:sp>
+        <p:nvSpPr>
+          <p:cNvPr id="2" name="Slide Image Placeholder 1"/>
+          <p:cNvSpPr>
+            <a:spLocks noGrp="1" noRot="1" noChangeAspect="1"/>
+          </p:cNvSpPr>
+          <p:nvPr>
+            <p:ph type="sldImg"/>
+          </p:nvPr>
+        </p:nvSpPr>
+        <p:spPr/>
+      </p:sp>
+      <p:sp>
+        <p:nvSpPr>
+          <p:cNvPr id="3" name="Notes Placeholder 2"/>
+          <p:cNvSpPr>
+            <a:spLocks noGrp="1"/>
+          </p:cNvSpPr>
+          <p:nvPr>
+            <p:ph type="body" idx="1"/>
+          </p:nvPr>
+        </p:nvSpPr>
+        <p:spPr/>
+        <p:txBody>
+          <a:bodyPr/>
+          <a:lstStyle/>
+          <a:p>
+            <a:r>
+              <a:rPr lang="nl-BE" dirty="0"/>
+              <a:t>The customer is </a:t>
+            </a:r>
+            <a:r>
+              <a:rPr lang="nl-BE" dirty="0" err="1"/>
+              <a:t>an</a:t>
+            </a:r>
+            <a:r>
+              <a:rPr lang="nl-BE" dirty="0"/>
+              <a:t> </a:t>
+            </a:r>
+            <a:r>
+              <a:rPr lang="nl-BE" dirty="0" err="1"/>
+              <a:t>international</a:t>
+            </a:r>
+            <a:r>
+              <a:rPr lang="nl-BE" dirty="0"/>
+              <a:t> holding </a:t>
+            </a:r>
+            <a:r>
+              <a:rPr lang="nl-BE" dirty="0" err="1"/>
+              <a:t>with</a:t>
+            </a:r>
+            <a:r>
+              <a:rPr lang="nl-BE" dirty="0"/>
+              <a:t> </a:t>
+            </a:r>
+            <a:r>
+              <a:rPr lang="nl-BE" dirty="0" err="1"/>
+              <a:t>several</a:t>
+            </a:r>
+            <a:r>
+              <a:rPr lang="nl-BE" dirty="0"/>
+              <a:t> </a:t>
+            </a:r>
+            <a:r>
+              <a:rPr lang="nl-BE" dirty="0" err="1"/>
+              <a:t>operational</a:t>
+            </a:r>
+            <a:r>
+              <a:rPr lang="nl-BE" dirty="0"/>
+              <a:t> companies </a:t>
+            </a:r>
+            <a:r>
+              <a:rPr lang="nl-BE" dirty="0" err="1"/>
+              <a:t>around</a:t>
+            </a:r>
+            <a:r>
+              <a:rPr lang="nl-BE" dirty="0"/>
+              <a:t> </a:t>
+            </a:r>
+            <a:r>
+              <a:rPr lang="nl-BE" dirty="0" err="1"/>
+              <a:t>the</a:t>
+            </a:r>
+            <a:r>
+              <a:rPr lang="nl-BE" dirty="0"/>
+              <a:t> </a:t>
+            </a:r>
+            <a:r>
+              <a:rPr lang="nl-BE" dirty="0" err="1"/>
+              <a:t>world</a:t>
+            </a:r>
+            <a:r>
+              <a:rPr lang="nl-BE" dirty="0"/>
+              <a:t>. These companies have </a:t>
+            </a:r>
+            <a:r>
+              <a:rPr lang="nl-BE" dirty="0" err="1"/>
+              <a:t>their</a:t>
+            </a:r>
+            <a:r>
+              <a:rPr lang="nl-BE" dirty="0"/>
+              <a:t> </a:t>
+            </a:r>
+            <a:r>
+              <a:rPr lang="nl-BE" dirty="0" err="1"/>
+              <a:t>own</a:t>
+            </a:r>
+            <a:r>
+              <a:rPr lang="nl-BE" dirty="0"/>
+              <a:t> </a:t>
+            </a:r>
+            <a:r>
+              <a:rPr lang="nl-BE" dirty="0" err="1"/>
+              <a:t>local</a:t>
+            </a:r>
+            <a:r>
+              <a:rPr lang="nl-BE" dirty="0"/>
+              <a:t> IT environment, but </a:t>
+            </a:r>
+            <a:r>
+              <a:rPr lang="nl-BE" dirty="0" err="1"/>
+              <a:t>also</a:t>
+            </a:r>
+            <a:r>
+              <a:rPr lang="nl-BE" dirty="0"/>
+              <a:t> </a:t>
+            </a:r>
+            <a:r>
+              <a:rPr lang="nl-BE" dirty="0" err="1"/>
+              <a:t>their</a:t>
+            </a:r>
+            <a:r>
+              <a:rPr lang="nl-BE" dirty="0"/>
+              <a:t> </a:t>
+            </a:r>
+            <a:r>
+              <a:rPr lang="nl-BE" dirty="0" err="1"/>
+              <a:t>own</a:t>
+            </a:r>
+            <a:r>
+              <a:rPr lang="nl-BE" dirty="0"/>
+              <a:t> back offices. HR </a:t>
+            </a:r>
+            <a:r>
+              <a:rPr lang="nl-BE" dirty="0" err="1"/>
+              <a:t>isn’t</a:t>
+            </a:r>
+            <a:r>
+              <a:rPr lang="nl-BE" dirty="0"/>
+              <a:t> managent </a:t>
+            </a:r>
+            <a:r>
+              <a:rPr lang="nl-BE" dirty="0" err="1"/>
+              <a:t>centrally</a:t>
+            </a:r>
+            <a:r>
+              <a:rPr lang="nl-BE" dirty="0"/>
+              <a:t>, but </a:t>
+            </a:r>
+            <a:r>
+              <a:rPr lang="nl-BE" dirty="0" err="1"/>
+              <a:t>by</a:t>
+            </a:r>
+            <a:r>
+              <a:rPr lang="nl-BE" dirty="0"/>
+              <a:t> </a:t>
+            </a:r>
+            <a:r>
+              <a:rPr lang="nl-BE" dirty="0" err="1"/>
+              <a:t>the</a:t>
+            </a:r>
+            <a:r>
+              <a:rPr lang="nl-BE" dirty="0"/>
+              <a:t> </a:t>
+            </a:r>
+            <a:r>
+              <a:rPr lang="nl-BE" dirty="0" err="1"/>
+              <a:t>Operation</a:t>
+            </a:r>
+            <a:r>
+              <a:rPr lang="nl-BE" dirty="0"/>
+              <a:t> Companies </a:t>
+            </a:r>
+            <a:r>
+              <a:rPr lang="nl-BE" dirty="0" err="1"/>
+              <a:t>themselves</a:t>
+            </a:r>
+            <a:r>
+              <a:rPr lang="nl-BE" dirty="0"/>
+              <a:t>.</a:t>
+            </a:r>
+          </a:p>
+          <a:p>
+            <a:endParaRPr lang="nl-BE" dirty="0"/>
+          </a:p>
+          <a:p>
+            <a:r>
+              <a:rPr lang="nl-BE" dirty="0" err="1"/>
+              <a:t>Still</a:t>
+            </a:r>
+            <a:r>
+              <a:rPr lang="nl-BE" dirty="0"/>
+              <a:t> </a:t>
+            </a:r>
+            <a:r>
+              <a:rPr lang="nl-BE" dirty="0" err="1"/>
+              <a:t>it</a:t>
+            </a:r>
+            <a:r>
+              <a:rPr lang="nl-BE" dirty="0"/>
+              <a:t> is important </a:t>
+            </a:r>
+            <a:r>
+              <a:rPr lang="nl-BE" dirty="0" err="1"/>
+              <a:t>to</a:t>
+            </a:r>
+            <a:r>
+              <a:rPr lang="nl-BE" dirty="0"/>
+              <a:t> have </a:t>
+            </a:r>
+            <a:r>
+              <a:rPr lang="nl-BE" dirty="0" err="1"/>
+              <a:t>all</a:t>
+            </a:r>
+            <a:r>
+              <a:rPr lang="nl-BE" dirty="0"/>
+              <a:t> user data in Active Directory, </a:t>
+            </a:r>
+            <a:r>
+              <a:rPr lang="nl-BE" dirty="0" err="1"/>
+              <a:t>so</a:t>
+            </a:r>
+            <a:r>
+              <a:rPr lang="nl-BE" dirty="0"/>
+              <a:t> </a:t>
+            </a:r>
+            <a:r>
+              <a:rPr lang="nl-BE" dirty="0" err="1"/>
+              <a:t>all</a:t>
+            </a:r>
+            <a:r>
+              <a:rPr lang="nl-BE" dirty="0"/>
+              <a:t> data </a:t>
+            </a:r>
+            <a:r>
+              <a:rPr lang="nl-BE" dirty="0" err="1"/>
+              <a:t>can</a:t>
+            </a:r>
+            <a:r>
+              <a:rPr lang="nl-BE" dirty="0"/>
+              <a:t> </a:t>
+            </a:r>
+            <a:r>
+              <a:rPr lang="nl-BE" dirty="0" err="1"/>
+              <a:t>be</a:t>
+            </a:r>
+            <a:r>
+              <a:rPr lang="nl-BE" dirty="0"/>
+              <a:t> </a:t>
+            </a:r>
+            <a:r>
+              <a:rPr lang="nl-BE" dirty="0" err="1"/>
+              <a:t>viewed</a:t>
+            </a:r>
+            <a:r>
+              <a:rPr lang="nl-BE" dirty="0"/>
+              <a:t> </a:t>
+            </a:r>
+            <a:r>
+              <a:rPr lang="nl-BE" dirty="0" err="1"/>
+              <a:t>across</a:t>
+            </a:r>
+            <a:r>
+              <a:rPr lang="nl-BE" dirty="0"/>
+              <a:t> </a:t>
+            </a:r>
+            <a:r>
+              <a:rPr lang="nl-BE" dirty="0" err="1"/>
+              <a:t>the</a:t>
+            </a:r>
+            <a:r>
+              <a:rPr lang="nl-BE" dirty="0"/>
+              <a:t> company, </a:t>
+            </a:r>
+            <a:r>
+              <a:rPr lang="nl-BE" dirty="0" err="1"/>
+              <a:t>for</a:t>
+            </a:r>
+            <a:r>
+              <a:rPr lang="nl-BE" dirty="0"/>
+              <a:t> </a:t>
+            </a:r>
+            <a:r>
+              <a:rPr lang="nl-BE" dirty="0" err="1"/>
+              <a:t>example</a:t>
+            </a:r>
+            <a:r>
+              <a:rPr lang="nl-BE" dirty="0"/>
+              <a:t> in Exchange.</a:t>
+            </a:r>
+          </a:p>
+          <a:p>
+            <a:endParaRPr lang="nl-BE" dirty="0"/>
+          </a:p>
+          <a:p>
+            <a:r>
+              <a:rPr lang="nl-BE" dirty="0"/>
+              <a:t>Of course, HR </a:t>
+            </a:r>
+            <a:r>
+              <a:rPr lang="nl-BE" dirty="0" err="1"/>
+              <a:t>officers</a:t>
+            </a:r>
+            <a:r>
+              <a:rPr lang="nl-BE" dirty="0"/>
+              <a:t> </a:t>
+            </a:r>
+            <a:r>
+              <a:rPr lang="nl-BE" dirty="0" err="1"/>
+              <a:t>around</a:t>
+            </a:r>
+            <a:r>
+              <a:rPr lang="nl-BE" dirty="0"/>
+              <a:t> </a:t>
+            </a:r>
+            <a:r>
+              <a:rPr lang="nl-BE" dirty="0" err="1"/>
+              <a:t>the</a:t>
+            </a:r>
+            <a:r>
+              <a:rPr lang="nl-BE" dirty="0"/>
+              <a:t> </a:t>
+            </a:r>
+            <a:r>
+              <a:rPr lang="nl-BE" dirty="0" err="1"/>
+              <a:t>world</a:t>
+            </a:r>
+            <a:r>
+              <a:rPr lang="nl-BE" dirty="0"/>
+              <a:t> are </a:t>
+            </a:r>
+            <a:r>
+              <a:rPr lang="nl-BE" dirty="0" err="1"/>
+              <a:t>not</a:t>
+            </a:r>
+            <a:r>
+              <a:rPr lang="nl-BE" dirty="0"/>
+              <a:t> </a:t>
+            </a:r>
+            <a:r>
+              <a:rPr lang="nl-BE" dirty="0" err="1"/>
+              <a:t>given</a:t>
+            </a:r>
+            <a:r>
+              <a:rPr lang="nl-BE" dirty="0"/>
+              <a:t> access </a:t>
+            </a:r>
+            <a:r>
+              <a:rPr lang="nl-BE" dirty="0" err="1"/>
+              <a:t>to</a:t>
+            </a:r>
+            <a:r>
+              <a:rPr lang="nl-BE" dirty="0"/>
+              <a:t> Active Directory </a:t>
+            </a:r>
+            <a:r>
+              <a:rPr lang="nl-BE" dirty="0" err="1"/>
+              <a:t>to</a:t>
+            </a:r>
+            <a:r>
+              <a:rPr lang="nl-BE" dirty="0"/>
+              <a:t> make changes </a:t>
+            </a:r>
+            <a:r>
+              <a:rPr lang="nl-BE" dirty="0" err="1"/>
+              <a:t>directly</a:t>
+            </a:r>
+            <a:r>
+              <a:rPr lang="nl-BE" dirty="0"/>
+              <a:t>. </a:t>
+            </a:r>
+            <a:r>
+              <a:rPr lang="nl-BE" dirty="0" err="1"/>
+              <a:t>Therefore</a:t>
+            </a:r>
+            <a:r>
+              <a:rPr lang="nl-BE" dirty="0"/>
+              <a:t>, a Salesforce software is </a:t>
+            </a:r>
+            <a:r>
+              <a:rPr lang="nl-BE" dirty="0" err="1"/>
+              <a:t>used</a:t>
+            </a:r>
+            <a:r>
+              <a:rPr lang="nl-BE" dirty="0"/>
+              <a:t> as a portal </a:t>
+            </a:r>
+            <a:r>
+              <a:rPr lang="nl-BE" dirty="0" err="1"/>
+              <a:t>to</a:t>
+            </a:r>
+            <a:r>
+              <a:rPr lang="nl-BE" dirty="0"/>
+              <a:t> </a:t>
+            </a:r>
+            <a:r>
+              <a:rPr lang="nl-BE" dirty="0" err="1"/>
+              <a:t>enable</a:t>
+            </a:r>
+            <a:r>
+              <a:rPr lang="nl-BE" dirty="0"/>
+              <a:t> </a:t>
+            </a:r>
+            <a:r>
+              <a:rPr lang="nl-BE" dirty="0" err="1"/>
+              <a:t>the</a:t>
+            </a:r>
+            <a:r>
+              <a:rPr lang="nl-BE" dirty="0"/>
+              <a:t> HR </a:t>
+            </a:r>
+            <a:r>
+              <a:rPr lang="nl-BE" dirty="0" err="1"/>
+              <a:t>officers</a:t>
+            </a:r>
+            <a:r>
+              <a:rPr lang="nl-BE" dirty="0"/>
+              <a:t> </a:t>
+            </a:r>
+            <a:r>
+              <a:rPr lang="nl-BE" dirty="0" err="1"/>
+              <a:t>to</a:t>
+            </a:r>
+            <a:r>
+              <a:rPr lang="nl-BE" dirty="0"/>
+              <a:t> </a:t>
+            </a:r>
+            <a:r>
+              <a:rPr lang="nl-BE" dirty="0" err="1"/>
+              <a:t>add</a:t>
+            </a:r>
+            <a:r>
+              <a:rPr lang="nl-BE" dirty="0"/>
+              <a:t> or </a:t>
+            </a:r>
+            <a:r>
+              <a:rPr lang="nl-BE" dirty="0" err="1"/>
+              <a:t>edit</a:t>
+            </a:r>
+            <a:r>
+              <a:rPr lang="nl-BE" dirty="0"/>
+              <a:t> </a:t>
+            </a:r>
+            <a:r>
+              <a:rPr lang="nl-BE" dirty="0" err="1"/>
+              <a:t>personnel</a:t>
+            </a:r>
+            <a:r>
+              <a:rPr lang="nl-BE" dirty="0"/>
+              <a:t> info. </a:t>
+            </a:r>
+            <a:r>
+              <a:rPr lang="nl-BE" dirty="0" err="1"/>
+              <a:t>This</a:t>
+            </a:r>
+            <a:r>
+              <a:rPr lang="nl-BE" dirty="0"/>
+              <a:t> info is </a:t>
+            </a:r>
+            <a:r>
+              <a:rPr lang="nl-BE" dirty="0" err="1"/>
+              <a:t>exported</a:t>
+            </a:r>
+            <a:r>
+              <a:rPr lang="nl-BE" dirty="0"/>
+              <a:t> </a:t>
+            </a:r>
+            <a:r>
+              <a:rPr lang="nl-BE" dirty="0" err="1"/>
+              <a:t>nightly</a:t>
+            </a:r>
+            <a:r>
+              <a:rPr lang="nl-BE" dirty="0"/>
+              <a:t> </a:t>
+            </a:r>
+            <a:r>
+              <a:rPr lang="nl-BE" dirty="0" err="1"/>
+              <a:t>to</a:t>
+            </a:r>
+            <a:r>
+              <a:rPr lang="nl-BE" dirty="0"/>
+              <a:t> </a:t>
+            </a:r>
+            <a:r>
+              <a:rPr lang="nl-BE" dirty="0" err="1"/>
+              <a:t>an</a:t>
+            </a:r>
+            <a:r>
+              <a:rPr lang="nl-BE" dirty="0"/>
+              <a:t> SFTP directory.</a:t>
+            </a:r>
+          </a:p>
+          <a:p>
+            <a:endParaRPr lang="nl-BE" dirty="0"/>
+          </a:p>
+          <a:p>
+            <a:r>
+              <a:rPr lang="nl-BE" dirty="0"/>
+              <a:t>The info, </a:t>
+            </a:r>
+            <a:r>
+              <a:rPr lang="nl-BE" dirty="0" err="1"/>
+              <a:t>entered</a:t>
+            </a:r>
+            <a:r>
+              <a:rPr lang="nl-BE" dirty="0"/>
+              <a:t> in </a:t>
+            </a:r>
+            <a:r>
+              <a:rPr lang="nl-BE" dirty="0" err="1"/>
+              <a:t>the</a:t>
+            </a:r>
+            <a:r>
+              <a:rPr lang="nl-BE" dirty="0"/>
+              <a:t> Salesforce </a:t>
+            </a:r>
+            <a:r>
+              <a:rPr lang="nl-BE" dirty="0" err="1"/>
+              <a:t>application</a:t>
+            </a:r>
+            <a:r>
+              <a:rPr lang="nl-BE" dirty="0"/>
+              <a:t>, </a:t>
+            </a:r>
+            <a:r>
+              <a:rPr lang="nl-BE" dirty="0" err="1"/>
+              <a:t>needs</a:t>
+            </a:r>
+            <a:r>
+              <a:rPr lang="nl-BE" dirty="0"/>
+              <a:t> </a:t>
+            </a:r>
+            <a:r>
+              <a:rPr lang="nl-BE" dirty="0" err="1"/>
+              <a:t>to</a:t>
+            </a:r>
+            <a:r>
+              <a:rPr lang="nl-BE" dirty="0"/>
+              <a:t> </a:t>
+            </a:r>
+            <a:r>
+              <a:rPr lang="nl-BE" dirty="0" err="1"/>
+              <a:t>be</a:t>
+            </a:r>
+            <a:r>
+              <a:rPr lang="nl-BE" dirty="0"/>
+              <a:t> </a:t>
+            </a:r>
+            <a:r>
+              <a:rPr lang="nl-BE" dirty="0" err="1"/>
+              <a:t>added</a:t>
+            </a:r>
+            <a:r>
+              <a:rPr lang="nl-BE" dirty="0"/>
+              <a:t> </a:t>
+            </a:r>
+            <a:r>
+              <a:rPr lang="nl-BE" dirty="0" err="1"/>
+              <a:t>to</a:t>
+            </a:r>
+            <a:r>
+              <a:rPr lang="nl-BE" dirty="0"/>
+              <a:t> </a:t>
+            </a:r>
+            <a:r>
+              <a:rPr lang="nl-BE" dirty="0" err="1"/>
+              <a:t>the</a:t>
+            </a:r>
+            <a:r>
+              <a:rPr lang="nl-BE" dirty="0"/>
+              <a:t> user in Active Directory </a:t>
+            </a:r>
+            <a:r>
+              <a:rPr lang="nl-BE" dirty="0" err="1"/>
+              <a:t>with</a:t>
+            </a:r>
+            <a:r>
+              <a:rPr lang="nl-BE" dirty="0"/>
+              <a:t> </a:t>
+            </a:r>
+            <a:r>
+              <a:rPr lang="nl-BE" dirty="0" err="1"/>
+              <a:t>the</a:t>
+            </a:r>
+            <a:r>
+              <a:rPr lang="nl-BE" dirty="0"/>
+              <a:t> </a:t>
+            </a:r>
+            <a:r>
+              <a:rPr lang="nl-BE" dirty="0" err="1"/>
+              <a:t>same</a:t>
+            </a:r>
+            <a:r>
+              <a:rPr lang="nl-BE" dirty="0"/>
+              <a:t> ID, but </a:t>
+            </a:r>
+            <a:r>
+              <a:rPr lang="nl-BE" dirty="0" err="1"/>
+              <a:t>some</a:t>
+            </a:r>
+            <a:r>
+              <a:rPr lang="nl-BE" dirty="0"/>
+              <a:t> details, like email </a:t>
+            </a:r>
+            <a:r>
+              <a:rPr lang="nl-BE" dirty="0" err="1"/>
+              <a:t>address</a:t>
+            </a:r>
+            <a:r>
+              <a:rPr lang="nl-BE" dirty="0"/>
+              <a:t> </a:t>
+            </a:r>
+            <a:r>
+              <a:rPr lang="nl-BE" dirty="0" err="1"/>
+              <a:t>and</a:t>
+            </a:r>
+            <a:r>
+              <a:rPr lang="nl-BE" dirty="0"/>
+              <a:t> User </a:t>
+            </a:r>
+            <a:r>
+              <a:rPr lang="nl-BE" dirty="0" err="1"/>
+              <a:t>Principal</a:t>
+            </a:r>
+            <a:r>
+              <a:rPr lang="nl-BE" dirty="0"/>
+              <a:t> Name, </a:t>
+            </a:r>
+            <a:r>
+              <a:rPr lang="nl-BE" dirty="0" err="1"/>
+              <a:t>needs</a:t>
+            </a:r>
+            <a:r>
+              <a:rPr lang="nl-BE" dirty="0"/>
+              <a:t> </a:t>
+            </a:r>
+            <a:r>
+              <a:rPr lang="nl-BE" dirty="0" err="1"/>
+              <a:t>to</a:t>
+            </a:r>
+            <a:r>
+              <a:rPr lang="nl-BE" dirty="0"/>
+              <a:t> </a:t>
+            </a:r>
+            <a:r>
+              <a:rPr lang="nl-BE" dirty="0" err="1"/>
+              <a:t>be</a:t>
+            </a:r>
+            <a:r>
+              <a:rPr lang="nl-BE" dirty="0"/>
+              <a:t> </a:t>
+            </a:r>
+            <a:r>
+              <a:rPr lang="nl-BE" dirty="0" err="1"/>
+              <a:t>generated</a:t>
+            </a:r>
+            <a:r>
+              <a:rPr lang="nl-BE" dirty="0"/>
+              <a:t> </a:t>
+            </a:r>
+            <a:r>
+              <a:rPr lang="nl-BE" dirty="0" err="1"/>
+              <a:t>by</a:t>
+            </a:r>
+            <a:r>
+              <a:rPr lang="nl-BE" dirty="0"/>
+              <a:t> </a:t>
+            </a:r>
+            <a:r>
+              <a:rPr lang="nl-BE" dirty="0" err="1"/>
+              <a:t>central</a:t>
+            </a:r>
+            <a:r>
+              <a:rPr lang="nl-BE" dirty="0"/>
+              <a:t> IT </a:t>
+            </a:r>
+            <a:r>
+              <a:rPr lang="nl-BE" dirty="0" err="1"/>
+              <a:t>and</a:t>
+            </a:r>
+            <a:r>
+              <a:rPr lang="nl-BE" dirty="0"/>
+              <a:t> </a:t>
+            </a:r>
+            <a:r>
+              <a:rPr lang="nl-BE" dirty="0" err="1"/>
+              <a:t>needs</a:t>
+            </a:r>
+            <a:r>
+              <a:rPr lang="nl-BE" dirty="0"/>
+              <a:t> </a:t>
+            </a:r>
+            <a:r>
+              <a:rPr lang="nl-BE" dirty="0" err="1"/>
+              <a:t>to</a:t>
+            </a:r>
+            <a:r>
+              <a:rPr lang="nl-BE" dirty="0"/>
+              <a:t> </a:t>
+            </a:r>
+            <a:r>
+              <a:rPr lang="nl-BE" dirty="0" err="1"/>
+              <a:t>be</a:t>
+            </a:r>
+            <a:r>
+              <a:rPr lang="nl-BE" dirty="0"/>
+              <a:t> </a:t>
+            </a:r>
+            <a:r>
+              <a:rPr lang="nl-BE" dirty="0" err="1"/>
+              <a:t>synchronized</a:t>
+            </a:r>
+            <a:r>
+              <a:rPr lang="nl-BE" dirty="0"/>
+              <a:t> back </a:t>
+            </a:r>
+            <a:r>
+              <a:rPr lang="nl-BE" dirty="0" err="1"/>
+              <a:t>to</a:t>
+            </a:r>
+            <a:r>
+              <a:rPr lang="nl-BE" dirty="0"/>
+              <a:t> </a:t>
+            </a:r>
+            <a:r>
+              <a:rPr lang="nl-BE" dirty="0" err="1"/>
+              <a:t>the</a:t>
+            </a:r>
+            <a:r>
+              <a:rPr lang="nl-BE" dirty="0"/>
+              <a:t> Salesforce </a:t>
+            </a:r>
+            <a:r>
+              <a:rPr lang="nl-BE" dirty="0" err="1"/>
+              <a:t>application</a:t>
+            </a:r>
+            <a:r>
+              <a:rPr lang="nl-BE" dirty="0"/>
+              <a:t>.</a:t>
+            </a:r>
+          </a:p>
+          <a:p>
+            <a:endParaRPr lang="nl-BE" dirty="0"/>
+          </a:p>
+          <a:p>
+            <a:r>
+              <a:rPr lang="nl-BE" dirty="0"/>
+              <a:t>Of course, software </a:t>
+            </a:r>
+            <a:r>
+              <a:rPr lang="nl-BE" dirty="0" err="1"/>
+              <a:t>to</a:t>
+            </a:r>
+            <a:r>
+              <a:rPr lang="nl-BE" dirty="0"/>
+              <a:t> handle these operations </a:t>
+            </a:r>
+            <a:r>
+              <a:rPr lang="nl-BE" dirty="0" err="1"/>
+              <a:t>exist</a:t>
+            </a:r>
+            <a:r>
+              <a:rPr lang="nl-BE" dirty="0"/>
+              <a:t>. But </a:t>
+            </a:r>
+            <a:r>
+              <a:rPr lang="nl-BE" dirty="0" err="1"/>
+              <a:t>the</a:t>
+            </a:r>
+            <a:r>
+              <a:rPr lang="nl-BE" dirty="0"/>
+              <a:t> customer </a:t>
+            </a:r>
+            <a:r>
+              <a:rPr lang="nl-BE" dirty="0" err="1"/>
+              <a:t>insisted</a:t>
+            </a:r>
+            <a:r>
+              <a:rPr lang="nl-BE" dirty="0"/>
+              <a:t> in </a:t>
+            </a:r>
+            <a:r>
+              <a:rPr lang="nl-BE" dirty="0" err="1"/>
+              <a:t>scripting</a:t>
+            </a:r>
+            <a:r>
+              <a:rPr lang="nl-BE" dirty="0"/>
+              <a:t> </a:t>
+            </a:r>
+            <a:r>
+              <a:rPr lang="nl-BE" dirty="0" err="1"/>
+              <a:t>the</a:t>
+            </a:r>
+            <a:r>
+              <a:rPr lang="nl-BE" dirty="0"/>
+              <a:t> solution </a:t>
+            </a:r>
+            <a:r>
+              <a:rPr lang="nl-BE" dirty="0" err="1"/>
+              <a:t>since</a:t>
+            </a:r>
+            <a:r>
+              <a:rPr lang="nl-BE" dirty="0"/>
+              <a:t> </a:t>
+            </a:r>
+            <a:r>
+              <a:rPr lang="nl-BE" dirty="0" err="1"/>
+              <a:t>they</a:t>
+            </a:r>
+            <a:r>
+              <a:rPr lang="nl-BE" dirty="0"/>
+              <a:t> had </a:t>
+            </a:r>
+            <a:r>
+              <a:rPr lang="nl-BE" dirty="0" err="1"/>
+              <a:t>invested</a:t>
+            </a:r>
+            <a:r>
+              <a:rPr lang="nl-BE" dirty="0"/>
+              <a:t> a lot </a:t>
+            </a:r>
+            <a:r>
+              <a:rPr lang="nl-BE" dirty="0" err="1"/>
+              <a:t>already</a:t>
+            </a:r>
+            <a:r>
+              <a:rPr lang="nl-BE" dirty="0"/>
+              <a:t> in a script </a:t>
+            </a:r>
+            <a:r>
+              <a:rPr lang="nl-BE" dirty="0" err="1"/>
+              <a:t>before</a:t>
+            </a:r>
+            <a:r>
+              <a:rPr lang="nl-BE" dirty="0"/>
+              <a:t> I </a:t>
+            </a:r>
+            <a:r>
+              <a:rPr lang="nl-BE" dirty="0" err="1"/>
+              <a:t>started</a:t>
+            </a:r>
+            <a:r>
+              <a:rPr lang="nl-BE" dirty="0"/>
+              <a:t> as a consultant </a:t>
+            </a:r>
+            <a:r>
+              <a:rPr lang="nl-BE" dirty="0" err="1"/>
+              <a:t>there</a:t>
+            </a:r>
+            <a:r>
+              <a:rPr lang="nl-BE" dirty="0"/>
+              <a:t>. </a:t>
+            </a:r>
+            <a:r>
+              <a:rPr lang="nl-BE" dirty="0" err="1"/>
+              <a:t>This</a:t>
+            </a:r>
+            <a:r>
+              <a:rPr lang="nl-BE" dirty="0"/>
+              <a:t> </a:t>
+            </a:r>
+            <a:r>
+              <a:rPr lang="nl-BE" dirty="0" err="1"/>
+              <a:t>also</a:t>
+            </a:r>
+            <a:r>
+              <a:rPr lang="nl-BE" dirty="0"/>
+              <a:t> </a:t>
+            </a:r>
+            <a:r>
+              <a:rPr lang="nl-BE" dirty="0" err="1"/>
+              <a:t>resulted</a:t>
+            </a:r>
+            <a:r>
+              <a:rPr lang="nl-BE" dirty="0"/>
+              <a:t> in a </a:t>
+            </a:r>
+            <a:r>
+              <a:rPr lang="nl-BE" dirty="0" err="1"/>
+              <a:t>very</a:t>
+            </a:r>
+            <a:r>
+              <a:rPr lang="nl-BE" dirty="0"/>
+              <a:t> </a:t>
+            </a:r>
+            <a:r>
+              <a:rPr lang="nl-BE" dirty="0" err="1"/>
+              <a:t>tight</a:t>
+            </a:r>
+            <a:r>
+              <a:rPr lang="nl-BE" dirty="0"/>
+              <a:t> </a:t>
+            </a:r>
+            <a:r>
+              <a:rPr lang="nl-BE" dirty="0" err="1"/>
+              <a:t>schedule</a:t>
+            </a:r>
+            <a:r>
+              <a:rPr lang="nl-BE" dirty="0"/>
+              <a:t> </a:t>
+            </a:r>
+            <a:r>
+              <a:rPr lang="nl-BE" dirty="0" err="1"/>
+              <a:t>to</a:t>
+            </a:r>
+            <a:r>
+              <a:rPr lang="nl-BE" dirty="0"/>
+              <a:t> </a:t>
+            </a:r>
+            <a:r>
+              <a:rPr lang="nl-BE" dirty="0" err="1"/>
+              <a:t>deliver</a:t>
+            </a:r>
+            <a:r>
+              <a:rPr lang="nl-BE" dirty="0"/>
+              <a:t> a solution.</a:t>
+            </a:r>
+          </a:p>
+        </p:txBody>
+      </p:sp>
+      <p:sp>
+        <p:nvSpPr>
+          <p:cNvPr id="4" name="Slide Number Placeholder 3"/>
+          <p:cNvSpPr>
+            <a:spLocks noGrp="1"/>
+          </p:cNvSpPr>
+          <p:nvPr>
+            <p:ph type="sldNum" sz="quarter" idx="5"/>
+          </p:nvPr>
+        </p:nvSpPr>
+        <p:spPr/>
+        <p:txBody>
+          <a:bodyPr/>
+          <a:lstStyle/>
+          <a:p>
+            <a:fld id="{4F5D4D40-D039-4272-86AA-C36A8296572F}" type="slidenum">
+              <a:rPr lang="nl-BE" smtClean="0"/>
+              <a:t>2</a:t>
+            </a:fld>
+            <a:endParaRPr lang="nl-BE"/>
+          </a:p>
+        </p:txBody>
+      </p:sp>
+    </p:spTree>
+    <p:extLst>
+      <p:ext uri="{BB962C8B-B14F-4D97-AF65-F5344CB8AC3E}">
+        <p14:creationId xmlns:p14="http://schemas.microsoft.com/office/powerpoint/2010/main" val="4159393973"/>
+      </p:ext>
+    </p:extLst>
+  </p:cSld>
+  <p:clrMapOvr>
+    <a:masterClrMapping/>
+  </p:clrMapOvr>
+</p:notes>
+</file>
+
+<file path=ppt/notesSlides/notesSlide3.xml><?xml version="1.0" encoding="utf-8"?>
+<p:notes xmlns:a="http://schemas.openxmlformats.org/drawingml/2006/main" xmlns:r="http://schemas.openxmlformats.org/officeDocument/2006/relationships" xmlns:p="http://schemas.openxmlformats.org/presentationml/2006/main">
+  <p:cSld>
+    <p:spTree>
+      <p:nvGrpSpPr>
+        <p:cNvPr id="1" name=""/>
+        <p:cNvGrpSpPr/>
+        <p:nvPr/>
+      </p:nvGrpSpPr>
+      <p:grpSpPr>
+        <a:xfrm>
+          <a:off x="0" y="0"/>
+          <a:ext cx="0" cy="0"/>
+          <a:chOff x="0" y="0"/>
+          <a:chExt cx="0" cy="0"/>
+        </a:xfrm>
+      </p:grpSpPr>
+      <p:sp>
+        <p:nvSpPr>
+          <p:cNvPr id="2" name="Slide Image Placeholder 1"/>
+          <p:cNvSpPr>
+            <a:spLocks noGrp="1" noRot="1" noChangeAspect="1"/>
+          </p:cNvSpPr>
+          <p:nvPr>
+            <p:ph type="sldImg"/>
+          </p:nvPr>
+        </p:nvSpPr>
+        <p:spPr/>
+      </p:sp>
+      <p:sp>
+        <p:nvSpPr>
+          <p:cNvPr id="3" name="Notes Placeholder 2"/>
+          <p:cNvSpPr>
+            <a:spLocks noGrp="1"/>
+          </p:cNvSpPr>
+          <p:nvPr>
+            <p:ph type="body" idx="1"/>
+          </p:nvPr>
+        </p:nvSpPr>
+        <p:spPr/>
+        <p:txBody>
+          <a:bodyPr/>
+          <a:lstStyle/>
+          <a:p>
+            <a:r>
+              <a:rPr lang="nl-BE" dirty="0"/>
+              <a:t>My first approach was </a:t>
+            </a:r>
+            <a:r>
+              <a:rPr lang="nl-BE" dirty="0" err="1"/>
+              <a:t>using</a:t>
+            </a:r>
+            <a:r>
+              <a:rPr lang="nl-BE" dirty="0"/>
+              <a:t> </a:t>
+            </a:r>
+            <a:r>
+              <a:rPr lang="nl-BE" dirty="0" err="1"/>
+              <a:t>PowerShell</a:t>
+            </a:r>
+            <a:r>
+              <a:rPr lang="nl-BE" dirty="0"/>
+              <a:t> </a:t>
+            </a:r>
+            <a:r>
+              <a:rPr lang="nl-BE" dirty="0" err="1"/>
+              <a:t>for</a:t>
+            </a:r>
+            <a:r>
+              <a:rPr lang="nl-BE" dirty="0"/>
+              <a:t> </a:t>
+            </a:r>
+            <a:r>
+              <a:rPr lang="nl-BE" dirty="0" err="1"/>
+              <a:t>the</a:t>
+            </a:r>
+            <a:r>
+              <a:rPr lang="nl-BE" dirty="0"/>
+              <a:t> complete solution, but </a:t>
+            </a:r>
+            <a:r>
+              <a:rPr lang="nl-BE" dirty="0" err="1"/>
+              <a:t>soon</a:t>
+            </a:r>
+            <a:r>
+              <a:rPr lang="nl-BE" dirty="0"/>
+              <a:t> I </a:t>
+            </a:r>
+            <a:r>
+              <a:rPr lang="nl-BE" dirty="0" err="1"/>
+              <a:t>realized</a:t>
+            </a:r>
+            <a:r>
+              <a:rPr lang="nl-BE" dirty="0"/>
+              <a:t> </a:t>
+            </a:r>
+            <a:r>
+              <a:rPr lang="nl-BE" dirty="0" err="1"/>
+              <a:t>that</a:t>
+            </a:r>
+            <a:r>
+              <a:rPr lang="nl-BE" dirty="0"/>
+              <a:t> </a:t>
+            </a:r>
+            <a:r>
+              <a:rPr lang="nl-BE" dirty="0" err="1"/>
+              <a:t>PowerShell</a:t>
+            </a:r>
+            <a:r>
+              <a:rPr lang="nl-BE" dirty="0"/>
+              <a:t> was </a:t>
+            </a:r>
+            <a:r>
+              <a:rPr lang="nl-BE" dirty="0" err="1"/>
+              <a:t>very</a:t>
+            </a:r>
+            <a:r>
+              <a:rPr lang="nl-BE" dirty="0"/>
+              <a:t> </a:t>
+            </a:r>
+            <a:r>
+              <a:rPr lang="nl-BE" dirty="0" err="1"/>
+              <a:t>limited</a:t>
+            </a:r>
+            <a:r>
+              <a:rPr lang="nl-BE" dirty="0"/>
+              <a:t> </a:t>
+            </a:r>
+            <a:r>
+              <a:rPr lang="nl-BE" dirty="0" err="1"/>
+              <a:t>to</a:t>
+            </a:r>
+            <a:r>
+              <a:rPr lang="nl-BE" dirty="0"/>
+              <a:t> </a:t>
+            </a:r>
+            <a:r>
+              <a:rPr lang="nl-BE" dirty="0" err="1"/>
+              <a:t>solve</a:t>
+            </a:r>
+            <a:r>
+              <a:rPr lang="nl-BE" dirty="0"/>
+              <a:t> </a:t>
+            </a:r>
+            <a:r>
+              <a:rPr lang="nl-BE" dirty="0" err="1"/>
+              <a:t>this</a:t>
+            </a:r>
+            <a:r>
+              <a:rPr lang="nl-BE" dirty="0"/>
+              <a:t> issue. </a:t>
+            </a:r>
+            <a:r>
+              <a:rPr lang="nl-BE" dirty="0" err="1"/>
+              <a:t>Everything</a:t>
+            </a:r>
+            <a:r>
+              <a:rPr lang="nl-BE" dirty="0"/>
+              <a:t> </a:t>
+            </a:r>
+            <a:r>
+              <a:rPr lang="nl-BE" dirty="0" err="1"/>
+              <a:t>could</a:t>
+            </a:r>
+            <a:r>
+              <a:rPr lang="nl-BE" dirty="0"/>
+              <a:t> </a:t>
+            </a:r>
+            <a:r>
+              <a:rPr lang="nl-BE" dirty="0" err="1"/>
+              <a:t>be</a:t>
+            </a:r>
+            <a:r>
+              <a:rPr lang="nl-BE" dirty="0"/>
+              <a:t> </a:t>
+            </a:r>
+            <a:r>
+              <a:rPr lang="nl-BE" dirty="0" err="1"/>
+              <a:t>done</a:t>
+            </a:r>
+            <a:r>
+              <a:rPr lang="nl-BE" dirty="0"/>
+              <a:t> </a:t>
+            </a:r>
+            <a:r>
+              <a:rPr lang="nl-BE" dirty="0" err="1"/>
+              <a:t>using</a:t>
+            </a:r>
+            <a:r>
+              <a:rPr lang="nl-BE" dirty="0"/>
+              <a:t> </a:t>
+            </a:r>
+            <a:r>
+              <a:rPr lang="nl-BE" dirty="0" err="1"/>
+              <a:t>PowerShell</a:t>
+            </a:r>
+            <a:r>
+              <a:rPr lang="nl-BE" dirty="0"/>
+              <a:t>, but </a:t>
+            </a:r>
+            <a:r>
+              <a:rPr lang="nl-BE" dirty="0" err="1"/>
+              <a:t>it</a:t>
+            </a:r>
+            <a:r>
+              <a:rPr lang="nl-BE" dirty="0"/>
+              <a:t> </a:t>
+            </a:r>
+            <a:r>
+              <a:rPr lang="nl-BE" dirty="0" err="1"/>
+              <a:t>took</a:t>
+            </a:r>
+            <a:r>
+              <a:rPr lang="nl-BE" dirty="0"/>
+              <a:t> a </a:t>
+            </a:r>
+            <a:r>
+              <a:rPr lang="nl-BE" dirty="0" err="1"/>
+              <a:t>very</a:t>
+            </a:r>
+            <a:r>
+              <a:rPr lang="nl-BE" dirty="0"/>
+              <a:t>, </a:t>
+            </a:r>
+            <a:r>
+              <a:rPr lang="nl-BE" dirty="0" err="1"/>
+              <a:t>very</a:t>
+            </a:r>
+            <a:r>
+              <a:rPr lang="nl-BE" dirty="0"/>
+              <a:t> long time </a:t>
+            </a:r>
+            <a:r>
+              <a:rPr lang="nl-BE" dirty="0" err="1"/>
+              <a:t>to</a:t>
+            </a:r>
+            <a:r>
+              <a:rPr lang="nl-BE" dirty="0"/>
+              <a:t> </a:t>
+            </a:r>
+            <a:r>
+              <a:rPr lang="nl-BE" dirty="0" err="1"/>
+              <a:t>process</a:t>
+            </a:r>
+            <a:r>
+              <a:rPr lang="nl-BE" dirty="0"/>
+              <a:t> </a:t>
+            </a:r>
+            <a:r>
+              <a:rPr lang="nl-BE" dirty="0" err="1"/>
+              <a:t>all</a:t>
+            </a:r>
+            <a:r>
+              <a:rPr lang="nl-BE" dirty="0"/>
+              <a:t> data. </a:t>
+            </a:r>
+            <a:r>
+              <a:rPr lang="nl-BE" dirty="0" err="1"/>
+              <a:t>Another</a:t>
+            </a:r>
+            <a:r>
+              <a:rPr lang="nl-BE" dirty="0"/>
+              <a:t> </a:t>
+            </a:r>
+            <a:r>
+              <a:rPr lang="nl-BE" dirty="0" err="1"/>
+              <a:t>problem</a:t>
+            </a:r>
+            <a:r>
+              <a:rPr lang="nl-BE" dirty="0"/>
+              <a:t> was </a:t>
+            </a:r>
+            <a:r>
+              <a:rPr lang="nl-BE" dirty="0" err="1"/>
+              <a:t>that</a:t>
+            </a:r>
+            <a:r>
+              <a:rPr lang="nl-BE" dirty="0"/>
+              <a:t> </a:t>
+            </a:r>
+            <a:r>
+              <a:rPr lang="nl-BE" dirty="0" err="1"/>
+              <a:t>the</a:t>
+            </a:r>
+            <a:r>
+              <a:rPr lang="nl-BE" dirty="0"/>
+              <a:t> way of processing data was </a:t>
+            </a:r>
+            <a:r>
+              <a:rPr lang="nl-BE" dirty="0" err="1"/>
+              <a:t>very</a:t>
+            </a:r>
+            <a:r>
+              <a:rPr lang="nl-BE" dirty="0"/>
+              <a:t> </a:t>
+            </a:r>
+            <a:r>
+              <a:rPr lang="nl-BE" dirty="0" err="1"/>
+              <a:t>difficult</a:t>
+            </a:r>
+            <a:r>
+              <a:rPr lang="nl-BE" dirty="0"/>
+              <a:t> </a:t>
+            </a:r>
+            <a:r>
+              <a:rPr lang="nl-BE" dirty="0" err="1"/>
+              <a:t>to</a:t>
+            </a:r>
+            <a:r>
+              <a:rPr lang="nl-BE" dirty="0"/>
+              <a:t> </a:t>
+            </a:r>
+            <a:r>
+              <a:rPr lang="nl-BE" dirty="0" err="1"/>
+              <a:t>read</a:t>
+            </a:r>
+            <a:r>
+              <a:rPr lang="nl-BE" dirty="0"/>
+              <a:t>.</a:t>
+            </a:r>
+          </a:p>
+          <a:p>
+            <a:endParaRPr lang="nl-BE" dirty="0"/>
+          </a:p>
+          <a:p>
+            <a:r>
+              <a:rPr lang="nl-BE" dirty="0"/>
+              <a:t>I </a:t>
+            </a:r>
+            <a:r>
+              <a:rPr lang="nl-BE" dirty="0" err="1"/>
+              <a:t>got</a:t>
+            </a:r>
+            <a:r>
+              <a:rPr lang="nl-BE" dirty="0"/>
+              <a:t> </a:t>
+            </a:r>
+            <a:r>
+              <a:rPr lang="nl-BE" dirty="0" err="1"/>
+              <a:t>stuck</a:t>
+            </a:r>
+            <a:r>
+              <a:rPr lang="nl-BE" dirty="0"/>
+              <a:t> </a:t>
+            </a:r>
+            <a:r>
+              <a:rPr lang="nl-BE" dirty="0" err="1"/>
+              <a:t>and</a:t>
+            </a:r>
+            <a:r>
+              <a:rPr lang="nl-BE" dirty="0"/>
+              <a:t> </a:t>
+            </a:r>
+            <a:r>
+              <a:rPr lang="nl-BE" dirty="0" err="1"/>
+              <a:t>needed</a:t>
+            </a:r>
+            <a:r>
+              <a:rPr lang="nl-BE" dirty="0"/>
+              <a:t> </a:t>
+            </a:r>
+            <a:r>
+              <a:rPr lang="nl-BE" dirty="0" err="1"/>
+              <a:t>to</a:t>
+            </a:r>
+            <a:r>
+              <a:rPr lang="nl-BE" dirty="0"/>
+              <a:t> </a:t>
+            </a:r>
+            <a:r>
+              <a:rPr lang="nl-BE" dirty="0" err="1"/>
+              <a:t>find</a:t>
+            </a:r>
+            <a:r>
+              <a:rPr lang="nl-BE" dirty="0"/>
+              <a:t> a solution </a:t>
+            </a:r>
+            <a:r>
+              <a:rPr lang="nl-BE" dirty="0" err="1"/>
+              <a:t>to</a:t>
+            </a:r>
+            <a:r>
+              <a:rPr lang="nl-BE" dirty="0"/>
+              <a:t> speed up </a:t>
+            </a:r>
+            <a:r>
+              <a:rPr lang="nl-BE" dirty="0" err="1"/>
+              <a:t>things</a:t>
+            </a:r>
+            <a:r>
+              <a:rPr lang="nl-BE" dirty="0"/>
+              <a:t>, </a:t>
+            </a:r>
+            <a:r>
+              <a:rPr lang="nl-BE" dirty="0" err="1"/>
+              <a:t>and</a:t>
+            </a:r>
+            <a:r>
+              <a:rPr lang="nl-BE" dirty="0"/>
+              <a:t> </a:t>
+            </a:r>
+            <a:r>
+              <a:rPr lang="nl-BE" dirty="0" err="1"/>
+              <a:t>to</a:t>
+            </a:r>
+            <a:r>
+              <a:rPr lang="nl-BE" dirty="0"/>
+              <a:t> make </a:t>
+            </a:r>
+            <a:r>
+              <a:rPr lang="nl-BE" dirty="0" err="1"/>
+              <a:t>it</a:t>
+            </a:r>
+            <a:r>
+              <a:rPr lang="nl-BE" dirty="0"/>
+              <a:t> </a:t>
+            </a:r>
+            <a:r>
+              <a:rPr lang="nl-BE" dirty="0" err="1"/>
+              <a:t>less</a:t>
+            </a:r>
+            <a:r>
+              <a:rPr lang="nl-BE" dirty="0"/>
+              <a:t> </a:t>
+            </a:r>
+            <a:r>
+              <a:rPr lang="nl-BE" dirty="0" err="1"/>
+              <a:t>complicated</a:t>
+            </a:r>
+            <a:r>
+              <a:rPr lang="nl-BE" dirty="0"/>
+              <a:t>.</a:t>
+            </a:r>
+          </a:p>
+          <a:p>
+            <a:endParaRPr lang="nl-BE" dirty="0"/>
+          </a:p>
+        </p:txBody>
+      </p:sp>
+      <p:sp>
+        <p:nvSpPr>
+          <p:cNvPr id="4" name="Slide Number Placeholder 3"/>
+          <p:cNvSpPr>
+            <a:spLocks noGrp="1"/>
+          </p:cNvSpPr>
+          <p:nvPr>
+            <p:ph type="sldNum" sz="quarter" idx="5"/>
+          </p:nvPr>
+        </p:nvSpPr>
+        <p:spPr/>
+        <p:txBody>
+          <a:bodyPr/>
+          <a:lstStyle/>
+          <a:p>
+            <a:fld id="{4F5D4D40-D039-4272-86AA-C36A8296572F}" type="slidenum">
+              <a:rPr lang="nl-BE" smtClean="0"/>
+              <a:t>3</a:t>
+            </a:fld>
+            <a:endParaRPr lang="nl-BE"/>
+          </a:p>
+        </p:txBody>
+      </p:sp>
+    </p:spTree>
+    <p:extLst>
+      <p:ext uri="{BB962C8B-B14F-4D97-AF65-F5344CB8AC3E}">
+        <p14:creationId xmlns:p14="http://schemas.microsoft.com/office/powerpoint/2010/main" val="3500867323"/>
+      </p:ext>
+    </p:extLst>
+  </p:cSld>
+  <p:clrMapOvr>
+    <a:masterClrMapping/>
+  </p:clrMapOvr>
+</p:notes>
+</file>
+
+<file path=ppt/notesSlides/notesSlide4.xml><?xml version="1.0" encoding="utf-8"?>
+<p:notes xmlns:a="http://schemas.openxmlformats.org/drawingml/2006/main" xmlns:r="http://schemas.openxmlformats.org/officeDocument/2006/relationships" xmlns:p="http://schemas.openxmlformats.org/presentationml/2006/main">
+  <p:cSld>
+    <p:spTree>
+      <p:nvGrpSpPr>
+        <p:cNvPr id="1" name=""/>
+        <p:cNvGrpSpPr/>
+        <p:nvPr/>
+      </p:nvGrpSpPr>
+      <p:grpSpPr>
+        <a:xfrm>
+          <a:off x="0" y="0"/>
+          <a:ext cx="0" cy="0"/>
+          <a:chOff x="0" y="0"/>
+          <a:chExt cx="0" cy="0"/>
+        </a:xfrm>
+      </p:grpSpPr>
+      <p:sp>
+        <p:nvSpPr>
+          <p:cNvPr id="2" name="Slide Image Placeholder 1"/>
+          <p:cNvSpPr>
+            <a:spLocks noGrp="1" noRot="1" noChangeAspect="1"/>
+          </p:cNvSpPr>
+          <p:nvPr>
+            <p:ph type="sldImg"/>
+          </p:nvPr>
+        </p:nvSpPr>
+        <p:spPr/>
+      </p:sp>
+      <p:sp>
+        <p:nvSpPr>
+          <p:cNvPr id="3" name="Notes Placeholder 2"/>
+          <p:cNvSpPr>
+            <a:spLocks noGrp="1"/>
+          </p:cNvSpPr>
+          <p:nvPr>
+            <p:ph type="body" idx="1"/>
+          </p:nvPr>
+        </p:nvSpPr>
+        <p:spPr/>
+        <p:txBody>
+          <a:bodyPr/>
+          <a:lstStyle/>
+          <a:p>
+            <a:r>
+              <a:rPr lang="nl-BE" dirty="0"/>
+              <a:t>A </a:t>
+            </a:r>
+            <a:r>
+              <a:rPr lang="nl-BE" dirty="0" err="1"/>
+              <a:t>colleague</a:t>
+            </a:r>
+            <a:r>
+              <a:rPr lang="nl-BE" dirty="0"/>
+              <a:t> </a:t>
+            </a:r>
+            <a:r>
+              <a:rPr lang="nl-BE" dirty="0" err="1"/>
+              <a:t>asked</a:t>
+            </a:r>
+            <a:r>
+              <a:rPr lang="nl-BE" dirty="0"/>
+              <a:t> me </a:t>
+            </a:r>
+            <a:r>
+              <a:rPr lang="nl-BE" dirty="0" err="1"/>
+              <a:t>why</a:t>
+            </a:r>
+            <a:r>
+              <a:rPr lang="nl-BE" dirty="0"/>
+              <a:t> I </a:t>
+            </a:r>
+            <a:r>
+              <a:rPr lang="nl-BE" dirty="0" err="1"/>
+              <a:t>didn’t</a:t>
+            </a:r>
+            <a:r>
+              <a:rPr lang="nl-BE" dirty="0"/>
+              <a:t> </a:t>
+            </a:r>
+            <a:r>
+              <a:rPr lang="nl-BE" dirty="0" err="1"/>
+              <a:t>process</a:t>
+            </a:r>
+            <a:r>
+              <a:rPr lang="nl-BE" dirty="0"/>
+              <a:t> </a:t>
+            </a:r>
+            <a:r>
+              <a:rPr lang="nl-BE" dirty="0" err="1"/>
+              <a:t>the</a:t>
+            </a:r>
+            <a:r>
+              <a:rPr lang="nl-BE" dirty="0"/>
+              <a:t> data in SQL server. </a:t>
+            </a:r>
+            <a:r>
+              <a:rPr lang="nl-BE" dirty="0" err="1"/>
+              <a:t>Not</a:t>
+            </a:r>
+            <a:r>
+              <a:rPr lang="nl-BE" dirty="0"/>
+              <a:t> </a:t>
+            </a:r>
+            <a:r>
+              <a:rPr lang="nl-BE" dirty="0" err="1"/>
+              <a:t>only</a:t>
+            </a:r>
+            <a:r>
+              <a:rPr lang="nl-BE" dirty="0"/>
+              <a:t> is SQL server </a:t>
+            </a:r>
+            <a:r>
+              <a:rPr lang="nl-BE" dirty="0" err="1"/>
+              <a:t>optimized</a:t>
+            </a:r>
+            <a:r>
+              <a:rPr lang="nl-BE" dirty="0"/>
+              <a:t> </a:t>
+            </a:r>
+            <a:r>
+              <a:rPr lang="nl-BE" dirty="0" err="1"/>
+              <a:t>to</a:t>
+            </a:r>
+            <a:r>
+              <a:rPr lang="nl-BE" dirty="0"/>
+              <a:t> </a:t>
+            </a:r>
+            <a:r>
+              <a:rPr lang="nl-BE" dirty="0" err="1"/>
+              <a:t>process</a:t>
+            </a:r>
+            <a:r>
+              <a:rPr lang="nl-BE" dirty="0"/>
+              <a:t> data, </a:t>
+            </a:r>
+            <a:r>
+              <a:rPr lang="nl-BE" dirty="0" err="1"/>
+              <a:t>so</a:t>
+            </a:r>
+            <a:r>
+              <a:rPr lang="nl-BE" dirty="0"/>
+              <a:t> </a:t>
+            </a:r>
+            <a:r>
+              <a:rPr lang="nl-BE" dirty="0" err="1"/>
+              <a:t>it</a:t>
+            </a:r>
+            <a:r>
+              <a:rPr lang="nl-BE" dirty="0"/>
+              <a:t> </a:t>
+            </a:r>
+            <a:r>
+              <a:rPr lang="nl-BE" dirty="0" err="1"/>
+              <a:t>should</a:t>
+            </a:r>
+            <a:r>
+              <a:rPr lang="nl-BE" dirty="0"/>
+              <a:t> </a:t>
+            </a:r>
+            <a:r>
+              <a:rPr lang="nl-BE" dirty="0" err="1"/>
+              <a:t>be</a:t>
+            </a:r>
+            <a:r>
+              <a:rPr lang="nl-BE" dirty="0"/>
+              <a:t> </a:t>
+            </a:r>
+            <a:r>
+              <a:rPr lang="nl-BE" dirty="0" err="1"/>
+              <a:t>very</a:t>
+            </a:r>
+            <a:r>
+              <a:rPr lang="nl-BE" dirty="0"/>
+              <a:t> </a:t>
+            </a:r>
+            <a:r>
+              <a:rPr lang="nl-BE" dirty="0" err="1"/>
+              <a:t>fast</a:t>
+            </a:r>
+            <a:r>
+              <a:rPr lang="nl-BE" dirty="0"/>
+              <a:t> in </a:t>
+            </a:r>
+            <a:r>
+              <a:rPr lang="nl-BE" dirty="0" err="1"/>
+              <a:t>donig</a:t>
+            </a:r>
+            <a:r>
+              <a:rPr lang="nl-BE" dirty="0"/>
+              <a:t> </a:t>
+            </a:r>
+            <a:r>
+              <a:rPr lang="nl-BE" dirty="0" err="1"/>
+              <a:t>so</a:t>
+            </a:r>
+            <a:r>
+              <a:rPr lang="nl-BE" dirty="0"/>
+              <a:t>, but SQL code is </a:t>
+            </a:r>
+            <a:r>
+              <a:rPr lang="nl-BE" dirty="0" err="1"/>
+              <a:t>very</a:t>
+            </a:r>
+            <a:r>
+              <a:rPr lang="nl-BE" dirty="0"/>
+              <a:t> </a:t>
+            </a:r>
+            <a:r>
+              <a:rPr lang="nl-BE" dirty="0" err="1"/>
+              <a:t>readable</a:t>
+            </a:r>
+            <a:r>
+              <a:rPr lang="nl-BE" dirty="0"/>
+              <a:t> </a:t>
+            </a:r>
+            <a:r>
+              <a:rPr lang="nl-BE" dirty="0" err="1"/>
+              <a:t>for</a:t>
+            </a:r>
+            <a:r>
+              <a:rPr lang="nl-BE" dirty="0"/>
+              <a:t> </a:t>
+            </a:r>
+            <a:r>
+              <a:rPr lang="nl-BE" dirty="0" err="1"/>
+              <a:t>people</a:t>
+            </a:r>
+            <a:r>
+              <a:rPr lang="nl-BE" dirty="0"/>
+              <a:t> </a:t>
+            </a:r>
+            <a:r>
+              <a:rPr lang="nl-BE" dirty="0" err="1"/>
+              <a:t>that</a:t>
+            </a:r>
+            <a:r>
+              <a:rPr lang="nl-BE" dirty="0"/>
+              <a:t> </a:t>
+            </a:r>
+            <a:r>
+              <a:rPr lang="nl-BE" dirty="0" err="1"/>
+              <a:t>know</a:t>
+            </a:r>
+            <a:r>
+              <a:rPr lang="nl-BE" dirty="0"/>
+              <a:t> SQL </a:t>
+            </a:r>
+            <a:r>
+              <a:rPr lang="nl-BE" dirty="0" err="1"/>
+              <a:t>language</a:t>
+            </a:r>
+            <a:r>
+              <a:rPr lang="nl-BE" dirty="0"/>
+              <a:t>. </a:t>
+            </a:r>
+            <a:r>
+              <a:rPr lang="nl-BE" dirty="0" err="1"/>
+              <a:t>So</a:t>
+            </a:r>
+            <a:r>
+              <a:rPr lang="nl-BE" dirty="0"/>
+              <a:t> i </a:t>
+            </a:r>
+            <a:r>
+              <a:rPr lang="nl-BE" dirty="0" err="1"/>
+              <a:t>created</a:t>
+            </a:r>
+            <a:r>
+              <a:rPr lang="nl-BE" dirty="0"/>
+              <a:t> </a:t>
+            </a:r>
+            <a:r>
+              <a:rPr lang="nl-BE" dirty="0" err="1"/>
+              <a:t>tables</a:t>
+            </a:r>
+            <a:r>
+              <a:rPr lang="nl-BE" dirty="0"/>
+              <a:t> in SQL server </a:t>
+            </a:r>
+            <a:r>
+              <a:rPr lang="nl-BE" dirty="0" err="1"/>
+              <a:t>to</a:t>
+            </a:r>
+            <a:r>
+              <a:rPr lang="nl-BE" dirty="0"/>
+              <a:t> </a:t>
+            </a:r>
+            <a:r>
+              <a:rPr lang="nl-BE" dirty="0" err="1"/>
+              <a:t>hold</a:t>
+            </a:r>
+            <a:r>
+              <a:rPr lang="nl-BE" dirty="0"/>
+              <a:t> </a:t>
+            </a:r>
+            <a:r>
+              <a:rPr lang="nl-BE" dirty="0" err="1"/>
+              <a:t>the</a:t>
+            </a:r>
+            <a:r>
+              <a:rPr lang="nl-BE" dirty="0"/>
+              <a:t> data </a:t>
+            </a:r>
+            <a:r>
+              <a:rPr lang="nl-BE" dirty="0" err="1"/>
+              <a:t>exported</a:t>
+            </a:r>
+            <a:r>
+              <a:rPr lang="nl-BE" dirty="0"/>
+              <a:t> </a:t>
+            </a:r>
+            <a:r>
+              <a:rPr lang="nl-BE" dirty="0" err="1"/>
+              <a:t>from</a:t>
+            </a:r>
+            <a:r>
+              <a:rPr lang="nl-BE" dirty="0"/>
+              <a:t> </a:t>
+            </a:r>
+            <a:r>
+              <a:rPr lang="nl-BE" dirty="0" err="1"/>
+              <a:t>the</a:t>
+            </a:r>
+            <a:r>
+              <a:rPr lang="nl-BE" dirty="0"/>
+              <a:t> Salesforce </a:t>
+            </a:r>
+            <a:r>
+              <a:rPr lang="nl-BE" dirty="0" err="1"/>
+              <a:t>application</a:t>
+            </a:r>
+            <a:r>
+              <a:rPr lang="nl-BE" dirty="0"/>
+              <a:t> </a:t>
+            </a:r>
+            <a:r>
+              <a:rPr lang="nl-BE" dirty="0" err="1"/>
+              <a:t>and</a:t>
+            </a:r>
+            <a:r>
+              <a:rPr lang="nl-BE" dirty="0"/>
+              <a:t> </a:t>
+            </a:r>
+            <a:r>
+              <a:rPr lang="nl-BE" dirty="0" err="1"/>
+              <a:t>from</a:t>
+            </a:r>
+            <a:r>
+              <a:rPr lang="nl-BE" dirty="0"/>
+              <a:t> Active Directory. </a:t>
+            </a:r>
+            <a:r>
+              <a:rPr lang="nl-BE" dirty="0" err="1"/>
+              <a:t>Tables</a:t>
+            </a:r>
+            <a:r>
+              <a:rPr lang="nl-BE" dirty="0"/>
+              <a:t> </a:t>
+            </a:r>
+            <a:r>
+              <a:rPr lang="nl-BE" dirty="0" err="1"/>
+              <a:t>for</a:t>
+            </a:r>
+            <a:r>
+              <a:rPr lang="nl-BE" dirty="0"/>
+              <a:t> </a:t>
+            </a:r>
+            <a:r>
+              <a:rPr lang="nl-BE" dirty="0" err="1"/>
+              <a:t>logging</a:t>
+            </a:r>
+            <a:r>
+              <a:rPr lang="nl-BE" dirty="0"/>
+              <a:t> </a:t>
+            </a:r>
+            <a:r>
+              <a:rPr lang="nl-BE" dirty="0" err="1"/>
+              <a:t>were</a:t>
+            </a:r>
+            <a:r>
+              <a:rPr lang="nl-BE" dirty="0"/>
+              <a:t> </a:t>
+            </a:r>
+            <a:r>
+              <a:rPr lang="nl-BE" dirty="0" err="1"/>
+              <a:t>also</a:t>
+            </a:r>
+            <a:r>
+              <a:rPr lang="nl-BE" dirty="0"/>
+              <a:t> </a:t>
+            </a:r>
+            <a:r>
+              <a:rPr lang="nl-BE" dirty="0" err="1"/>
+              <a:t>created</a:t>
+            </a:r>
+            <a:r>
+              <a:rPr lang="nl-BE" dirty="0"/>
+              <a:t> </a:t>
+            </a:r>
+            <a:r>
+              <a:rPr lang="nl-BE" dirty="0" err="1"/>
+              <a:t>where</a:t>
+            </a:r>
+            <a:r>
+              <a:rPr lang="nl-BE" dirty="0"/>
+              <a:t> </a:t>
+            </a:r>
+            <a:r>
+              <a:rPr lang="nl-BE" dirty="0" err="1"/>
+              <a:t>all</a:t>
+            </a:r>
+            <a:r>
+              <a:rPr lang="nl-BE" dirty="0"/>
+              <a:t> operations are </a:t>
+            </a:r>
+            <a:r>
+              <a:rPr lang="nl-BE" dirty="0" err="1"/>
+              <a:t>logged</a:t>
+            </a:r>
+            <a:r>
+              <a:rPr lang="nl-BE" dirty="0"/>
+              <a:t>. </a:t>
+            </a:r>
+            <a:r>
+              <a:rPr lang="nl-BE" dirty="0" err="1"/>
+              <a:t>This</a:t>
+            </a:r>
+            <a:r>
+              <a:rPr lang="nl-BE" dirty="0"/>
+              <a:t> </a:t>
+            </a:r>
+            <a:r>
+              <a:rPr lang="nl-BE" dirty="0" err="1"/>
+              <a:t>enables</a:t>
+            </a:r>
+            <a:r>
+              <a:rPr lang="nl-BE" dirty="0"/>
+              <a:t> </a:t>
+            </a:r>
+            <a:r>
+              <a:rPr lang="nl-BE" dirty="0" err="1"/>
+              <a:t>roll</a:t>
+            </a:r>
+            <a:r>
+              <a:rPr lang="nl-BE" dirty="0"/>
+              <a:t> back </a:t>
+            </a:r>
+            <a:r>
+              <a:rPr lang="nl-BE" dirty="0" err="1"/>
+              <a:t>and</a:t>
+            </a:r>
+            <a:r>
+              <a:rPr lang="nl-BE" dirty="0"/>
+              <a:t> auditing.</a:t>
+            </a:r>
+          </a:p>
+        </p:txBody>
+      </p:sp>
+      <p:sp>
+        <p:nvSpPr>
+          <p:cNvPr id="4" name="Slide Number Placeholder 3"/>
+          <p:cNvSpPr>
+            <a:spLocks noGrp="1"/>
+          </p:cNvSpPr>
+          <p:nvPr>
+            <p:ph type="sldNum" sz="quarter" idx="5"/>
+          </p:nvPr>
+        </p:nvSpPr>
+        <p:spPr/>
+        <p:txBody>
+          <a:bodyPr/>
+          <a:lstStyle/>
+          <a:p>
+            <a:fld id="{4F5D4D40-D039-4272-86AA-C36A8296572F}" type="slidenum">
+              <a:rPr lang="nl-BE" smtClean="0"/>
+              <a:t>4</a:t>
+            </a:fld>
+            <a:endParaRPr lang="nl-BE"/>
+          </a:p>
+        </p:txBody>
+      </p:sp>
+    </p:spTree>
+    <p:extLst>
+      <p:ext uri="{BB962C8B-B14F-4D97-AF65-F5344CB8AC3E}">
+        <p14:creationId xmlns:p14="http://schemas.microsoft.com/office/powerpoint/2010/main" val="1820254631"/>
+      </p:ext>
+    </p:extLst>
+  </p:cSld>
+  <p:clrMapOvr>
+    <a:masterClrMapping/>
+  </p:clrMapOvr>
+</p:notes>
+</file>
+
+<file path=ppt/notesSlides/notesSlide5.xml><?xml version="1.0" encoding="utf-8"?>
+<p:notes xmlns:a="http://schemas.openxmlformats.org/drawingml/2006/main" xmlns:r="http://schemas.openxmlformats.org/officeDocument/2006/relationships" xmlns:p="http://schemas.openxmlformats.org/presentationml/2006/main">
+  <p:cSld>
+    <p:spTree>
+      <p:nvGrpSpPr>
+        <p:cNvPr id="1" name=""/>
+        <p:cNvGrpSpPr/>
+        <p:nvPr/>
+      </p:nvGrpSpPr>
+      <p:grpSpPr>
+        <a:xfrm>
+          <a:off x="0" y="0"/>
+          <a:ext cx="0" cy="0"/>
+          <a:chOff x="0" y="0"/>
+          <a:chExt cx="0" cy="0"/>
+        </a:xfrm>
+      </p:grpSpPr>
+      <p:sp>
+        <p:nvSpPr>
+          <p:cNvPr id="2" name="Slide Image Placeholder 1"/>
+          <p:cNvSpPr>
+            <a:spLocks noGrp="1" noRot="1" noChangeAspect="1"/>
+          </p:cNvSpPr>
+          <p:nvPr>
+            <p:ph type="sldImg"/>
+          </p:nvPr>
+        </p:nvSpPr>
+        <p:spPr/>
+      </p:sp>
+      <p:sp>
+        <p:nvSpPr>
+          <p:cNvPr id="3" name="Notes Placeholder 2"/>
+          <p:cNvSpPr>
+            <a:spLocks noGrp="1"/>
+          </p:cNvSpPr>
+          <p:nvPr>
+            <p:ph type="body" idx="1"/>
+          </p:nvPr>
+        </p:nvSpPr>
+        <p:spPr/>
+        <p:txBody>
+          <a:bodyPr/>
+          <a:lstStyle/>
+          <a:p>
+            <a:r>
+              <a:rPr lang="nl-BE" dirty="0"/>
+              <a:t>Using SQL server </a:t>
+            </a:r>
+            <a:r>
+              <a:rPr lang="nl-BE" dirty="0" err="1"/>
+              <a:t>for</a:t>
+            </a:r>
+            <a:r>
+              <a:rPr lang="nl-BE" dirty="0"/>
+              <a:t> </a:t>
+            </a:r>
+            <a:r>
+              <a:rPr lang="nl-BE" dirty="0" err="1"/>
+              <a:t>the</a:t>
+            </a:r>
+            <a:r>
+              <a:rPr lang="nl-BE" dirty="0"/>
+              <a:t> processing of </a:t>
+            </a:r>
+            <a:r>
+              <a:rPr lang="nl-BE" dirty="0" err="1"/>
+              <a:t>the</a:t>
+            </a:r>
+            <a:r>
+              <a:rPr lang="nl-BE" dirty="0"/>
+              <a:t> data, I </a:t>
+            </a:r>
+            <a:r>
+              <a:rPr lang="nl-BE" dirty="0" err="1"/>
+              <a:t>could</a:t>
+            </a:r>
+            <a:r>
+              <a:rPr lang="nl-BE" dirty="0"/>
+              <a:t> </a:t>
+            </a:r>
+            <a:r>
+              <a:rPr lang="nl-BE" dirty="0" err="1"/>
+              <a:t>use</a:t>
+            </a:r>
+            <a:r>
+              <a:rPr lang="nl-BE" dirty="0"/>
+              <a:t> </a:t>
+            </a:r>
+            <a:r>
+              <a:rPr lang="nl-BE" dirty="0" err="1"/>
+              <a:t>PowerShell</a:t>
+            </a:r>
+            <a:r>
+              <a:rPr lang="nl-BE" dirty="0"/>
+              <a:t> in </a:t>
+            </a:r>
+            <a:r>
+              <a:rPr lang="nl-BE" dirty="0" err="1"/>
+              <a:t>its</a:t>
+            </a:r>
+            <a:r>
+              <a:rPr lang="nl-BE" dirty="0"/>
+              <a:t> full </a:t>
+            </a:r>
+            <a:r>
+              <a:rPr lang="nl-BE" dirty="0" err="1"/>
+              <a:t>potential</a:t>
+            </a:r>
+            <a:r>
+              <a:rPr lang="nl-BE" dirty="0"/>
+              <a:t> </a:t>
+            </a:r>
+            <a:r>
+              <a:rPr lang="nl-BE" dirty="0" err="1"/>
+              <a:t>to</a:t>
+            </a:r>
+            <a:r>
+              <a:rPr lang="nl-BE" dirty="0"/>
+              <a:t>:</a:t>
+            </a:r>
+          </a:p>
+          <a:p>
+            <a:endParaRPr lang="nl-BE" dirty="0"/>
+          </a:p>
+          <a:p>
+            <a:pPr marL="171450" indent="-171450">
+              <a:buFont typeface="Arial" panose="020B0604020202020204" pitchFamily="34" charset="0"/>
+              <a:buChar char="•"/>
+            </a:pPr>
+            <a:r>
+              <a:rPr lang="nl-BE" dirty="0"/>
+              <a:t>Import </a:t>
+            </a:r>
+            <a:r>
+              <a:rPr lang="nl-BE" dirty="0" err="1"/>
+              <a:t>all</a:t>
+            </a:r>
+            <a:r>
+              <a:rPr lang="nl-BE" dirty="0"/>
+              <a:t> data </a:t>
+            </a:r>
+            <a:r>
+              <a:rPr lang="nl-BE" dirty="0" err="1"/>
+              <a:t>from</a:t>
+            </a:r>
+            <a:r>
+              <a:rPr lang="nl-BE" dirty="0"/>
+              <a:t> </a:t>
+            </a:r>
+            <a:r>
+              <a:rPr lang="nl-BE" dirty="0" err="1"/>
+              <a:t>both</a:t>
+            </a:r>
+            <a:r>
+              <a:rPr lang="nl-BE" dirty="0"/>
+              <a:t> </a:t>
+            </a:r>
+            <a:r>
+              <a:rPr lang="nl-BE" dirty="0" err="1"/>
+              <a:t>the</a:t>
+            </a:r>
+            <a:r>
+              <a:rPr lang="nl-BE" dirty="0"/>
+              <a:t> Salesforce </a:t>
+            </a:r>
+            <a:r>
+              <a:rPr lang="nl-BE" dirty="0" err="1"/>
+              <a:t>application</a:t>
+            </a:r>
+            <a:r>
+              <a:rPr lang="nl-BE" dirty="0"/>
+              <a:t> </a:t>
+            </a:r>
+            <a:r>
+              <a:rPr lang="nl-BE" dirty="0" err="1"/>
+              <a:t>and</a:t>
+            </a:r>
+            <a:r>
+              <a:rPr lang="nl-BE" dirty="0"/>
+              <a:t> Active Directory </a:t>
+            </a:r>
+            <a:r>
+              <a:rPr lang="nl-BE" dirty="0" err="1"/>
+              <a:t>to</a:t>
+            </a:r>
+            <a:r>
+              <a:rPr lang="nl-BE" dirty="0"/>
+              <a:t> SQL Server</a:t>
+            </a:r>
+          </a:p>
+          <a:p>
+            <a:pPr marL="171450" indent="-171450">
+              <a:buFont typeface="Arial" panose="020B0604020202020204" pitchFamily="34" charset="0"/>
+              <a:buChar char="•"/>
+            </a:pPr>
+            <a:r>
+              <a:rPr lang="nl-BE" dirty="0"/>
+              <a:t>Kick-off </a:t>
+            </a:r>
+            <a:r>
+              <a:rPr lang="nl-BE" dirty="0" err="1"/>
+              <a:t>all</a:t>
+            </a:r>
+            <a:r>
+              <a:rPr lang="nl-BE" dirty="0"/>
+              <a:t> </a:t>
+            </a:r>
+            <a:r>
+              <a:rPr lang="nl-BE" dirty="0" err="1"/>
+              <a:t>Stored</a:t>
+            </a:r>
+            <a:r>
+              <a:rPr lang="nl-BE" dirty="0"/>
+              <a:t> Procedures, </a:t>
+            </a:r>
+            <a:r>
+              <a:rPr lang="nl-BE" dirty="0" err="1"/>
+              <a:t>created</a:t>
+            </a:r>
+            <a:r>
+              <a:rPr lang="nl-BE" dirty="0"/>
+              <a:t> in SQL Server</a:t>
+            </a:r>
+          </a:p>
+          <a:p>
+            <a:pPr marL="171450" indent="-171450">
+              <a:buFont typeface="Arial" panose="020B0604020202020204" pitchFamily="34" charset="0"/>
+              <a:buChar char="•"/>
+            </a:pPr>
+            <a:r>
+              <a:rPr lang="nl-BE" dirty="0" err="1"/>
+              <a:t>Retrieve</a:t>
+            </a:r>
+            <a:r>
+              <a:rPr lang="nl-BE" dirty="0"/>
+              <a:t> </a:t>
+            </a:r>
+            <a:r>
+              <a:rPr lang="nl-BE" dirty="0" err="1"/>
+              <a:t>all</a:t>
+            </a:r>
+            <a:r>
+              <a:rPr lang="nl-BE" dirty="0"/>
+              <a:t> data </a:t>
+            </a:r>
+            <a:r>
+              <a:rPr lang="nl-BE" dirty="0" err="1"/>
+              <a:t>and</a:t>
+            </a:r>
+            <a:r>
+              <a:rPr lang="nl-BE" dirty="0"/>
+              <a:t> push </a:t>
+            </a:r>
+            <a:r>
+              <a:rPr lang="nl-BE" dirty="0" err="1"/>
+              <a:t>it</a:t>
+            </a:r>
+            <a:r>
+              <a:rPr lang="nl-BE" dirty="0"/>
+              <a:t> </a:t>
+            </a:r>
+            <a:r>
+              <a:rPr lang="nl-BE" dirty="0" err="1"/>
+              <a:t>to</a:t>
+            </a:r>
+            <a:r>
+              <a:rPr lang="nl-BE" dirty="0"/>
+              <a:t>  </a:t>
+            </a:r>
+            <a:r>
+              <a:rPr lang="nl-BE" dirty="0" err="1"/>
+              <a:t>the</a:t>
+            </a:r>
+            <a:r>
+              <a:rPr lang="nl-BE" dirty="0"/>
+              <a:t> target systems</a:t>
+            </a:r>
+          </a:p>
+          <a:p>
+            <a:pPr marL="171450" indent="-171450">
+              <a:buFont typeface="Arial" panose="020B0604020202020204" pitchFamily="34" charset="0"/>
+              <a:buChar char="•"/>
+            </a:pPr>
+            <a:r>
+              <a:rPr lang="nl-BE" dirty="0"/>
+              <a:t>Email </a:t>
+            </a:r>
+            <a:r>
+              <a:rPr lang="nl-BE" dirty="0" err="1"/>
+              <a:t>reports</a:t>
+            </a:r>
+            <a:r>
+              <a:rPr lang="nl-BE" dirty="0"/>
+              <a:t> </a:t>
+            </a:r>
+            <a:r>
+              <a:rPr lang="nl-BE" dirty="0" err="1"/>
+              <a:t>to</a:t>
+            </a:r>
+            <a:r>
+              <a:rPr lang="nl-BE" dirty="0"/>
+              <a:t> </a:t>
+            </a:r>
+            <a:r>
+              <a:rPr lang="nl-BE" dirty="0" err="1"/>
+              <a:t>the</a:t>
+            </a:r>
+            <a:r>
+              <a:rPr lang="nl-BE" dirty="0"/>
+              <a:t> </a:t>
+            </a:r>
+            <a:r>
+              <a:rPr lang="nl-BE" dirty="0" err="1"/>
+              <a:t>required</a:t>
+            </a:r>
+            <a:r>
+              <a:rPr lang="nl-BE" dirty="0"/>
+              <a:t> </a:t>
+            </a:r>
+            <a:r>
+              <a:rPr lang="nl-BE" dirty="0" err="1"/>
+              <a:t>recipients</a:t>
+            </a:r>
+            <a:endParaRPr lang="nl-BE" dirty="0"/>
+          </a:p>
+        </p:txBody>
+      </p:sp>
+      <p:sp>
+        <p:nvSpPr>
+          <p:cNvPr id="4" name="Slide Number Placeholder 3"/>
+          <p:cNvSpPr>
+            <a:spLocks noGrp="1"/>
+          </p:cNvSpPr>
+          <p:nvPr>
+            <p:ph type="sldNum" sz="quarter" idx="5"/>
+          </p:nvPr>
+        </p:nvSpPr>
+        <p:spPr/>
+        <p:txBody>
+          <a:bodyPr/>
+          <a:lstStyle/>
+          <a:p>
+            <a:fld id="{4F5D4D40-D039-4272-86AA-C36A8296572F}" type="slidenum">
+              <a:rPr lang="nl-BE" smtClean="0"/>
+              <a:t>5</a:t>
+            </a:fld>
+            <a:endParaRPr lang="nl-BE"/>
+          </a:p>
+        </p:txBody>
+      </p:sp>
+    </p:spTree>
+    <p:extLst>
+      <p:ext uri="{BB962C8B-B14F-4D97-AF65-F5344CB8AC3E}">
+        <p14:creationId xmlns:p14="http://schemas.microsoft.com/office/powerpoint/2010/main" val="1824658830"/>
+      </p:ext>
+    </p:extLst>
+  </p:cSld>
+  <p:clrMapOvr>
+    <a:masterClrMapping/>
+  </p:clrMapOvr>
+</p:notes>
+</file>
+
+<file path=ppt/notesSlides/notesSlide6.xml><?xml version="1.0" encoding="utf-8"?>
+<p:notes xmlns:a="http://schemas.openxmlformats.org/drawingml/2006/main" xmlns:r="http://schemas.openxmlformats.org/officeDocument/2006/relationships" xmlns:p="http://schemas.openxmlformats.org/presentationml/2006/main">
+  <p:cSld>
+    <p:spTree>
+      <p:nvGrpSpPr>
+        <p:cNvPr id="1" name=""/>
+        <p:cNvGrpSpPr/>
+        <p:nvPr/>
+      </p:nvGrpSpPr>
+      <p:grpSpPr>
+        <a:xfrm>
+          <a:off x="0" y="0"/>
+          <a:ext cx="0" cy="0"/>
+          <a:chOff x="0" y="0"/>
+          <a:chExt cx="0" cy="0"/>
+        </a:xfrm>
+      </p:grpSpPr>
+      <p:sp>
+        <p:nvSpPr>
+          <p:cNvPr id="2" name="Slide Image Placeholder 1"/>
+          <p:cNvSpPr>
+            <a:spLocks noGrp="1" noRot="1" noChangeAspect="1"/>
+          </p:cNvSpPr>
+          <p:nvPr>
+            <p:ph type="sldImg"/>
+          </p:nvPr>
+        </p:nvSpPr>
+        <p:spPr/>
+      </p:sp>
+      <p:sp>
+        <p:nvSpPr>
+          <p:cNvPr id="3" name="Notes Placeholder 2"/>
+          <p:cNvSpPr>
+            <a:spLocks noGrp="1"/>
+          </p:cNvSpPr>
+          <p:nvPr>
+            <p:ph type="body" idx="1"/>
+          </p:nvPr>
+        </p:nvSpPr>
+        <p:spPr/>
+        <p:txBody>
+          <a:bodyPr/>
+          <a:lstStyle/>
+          <a:p>
+            <a:r>
+              <a:rPr lang="nl-BE" dirty="0"/>
+              <a:t>The </a:t>
+            </a:r>
+            <a:r>
+              <a:rPr lang="nl-BE" dirty="0" err="1"/>
+              <a:t>separation</a:t>
+            </a:r>
+            <a:r>
+              <a:rPr lang="nl-BE" dirty="0"/>
+              <a:t> of </a:t>
+            </a:r>
+            <a:r>
+              <a:rPr lang="nl-BE" dirty="0" err="1"/>
+              <a:t>the</a:t>
+            </a:r>
+            <a:r>
+              <a:rPr lang="nl-BE" dirty="0"/>
+              <a:t> code </a:t>
+            </a:r>
+            <a:r>
+              <a:rPr lang="nl-BE" dirty="0" err="1"/>
+              <a:t>and</a:t>
+            </a:r>
+            <a:r>
+              <a:rPr lang="nl-BE" dirty="0"/>
+              <a:t> data processing </a:t>
+            </a:r>
+            <a:r>
+              <a:rPr lang="nl-BE" dirty="0" err="1"/>
+              <a:t>layers</a:t>
+            </a:r>
+            <a:r>
+              <a:rPr lang="nl-BE" dirty="0"/>
+              <a:t> has </a:t>
+            </a:r>
+            <a:r>
+              <a:rPr lang="nl-BE" dirty="0" err="1"/>
+              <a:t>some</a:t>
+            </a:r>
+            <a:r>
+              <a:rPr lang="nl-BE" dirty="0"/>
+              <a:t> major benefits!</a:t>
+            </a:r>
+          </a:p>
+          <a:p>
+            <a:endParaRPr lang="nl-BE" dirty="0"/>
+          </a:p>
+          <a:p>
+            <a:r>
+              <a:rPr lang="nl-BE" dirty="0" err="1"/>
+              <a:t>PowerShell</a:t>
+            </a:r>
+            <a:r>
+              <a:rPr lang="nl-BE" dirty="0"/>
+              <a:t> code </a:t>
+            </a:r>
+            <a:r>
+              <a:rPr lang="nl-BE" dirty="0" err="1"/>
+              <a:t>can</a:t>
+            </a:r>
+            <a:r>
+              <a:rPr lang="nl-BE" dirty="0"/>
+              <a:t> </a:t>
+            </a:r>
+            <a:r>
+              <a:rPr lang="nl-BE" dirty="0" err="1"/>
+              <a:t>be</a:t>
+            </a:r>
+            <a:r>
+              <a:rPr lang="nl-BE" dirty="0"/>
+              <a:t> </a:t>
+            </a:r>
+            <a:r>
+              <a:rPr lang="nl-BE" dirty="0" err="1"/>
+              <a:t>managed</a:t>
+            </a:r>
+            <a:r>
+              <a:rPr lang="nl-BE" dirty="0"/>
+              <a:t> </a:t>
+            </a:r>
+            <a:r>
+              <a:rPr lang="nl-BE" dirty="0" err="1"/>
+              <a:t>by</a:t>
+            </a:r>
+            <a:r>
+              <a:rPr lang="nl-BE" dirty="0"/>
+              <a:t> </a:t>
+            </a:r>
+            <a:r>
+              <a:rPr lang="nl-BE" dirty="0" err="1"/>
+              <a:t>someone</a:t>
+            </a:r>
+            <a:r>
+              <a:rPr lang="nl-BE" dirty="0"/>
+              <a:t> </a:t>
+            </a:r>
+            <a:r>
+              <a:rPr lang="nl-BE" dirty="0" err="1"/>
+              <a:t>who</a:t>
+            </a:r>
+            <a:r>
+              <a:rPr lang="nl-BE" dirty="0"/>
+              <a:t> is </a:t>
+            </a:r>
+            <a:r>
+              <a:rPr lang="nl-BE" dirty="0" err="1"/>
+              <a:t>specialized</a:t>
+            </a:r>
+            <a:r>
+              <a:rPr lang="nl-BE" dirty="0"/>
+              <a:t> in </a:t>
+            </a:r>
+            <a:r>
+              <a:rPr lang="nl-BE" dirty="0" err="1"/>
+              <a:t>PowerShell</a:t>
+            </a:r>
+            <a:r>
+              <a:rPr lang="nl-BE" dirty="0"/>
+              <a:t> without </a:t>
+            </a:r>
+            <a:r>
+              <a:rPr lang="nl-BE" dirty="0" err="1"/>
+              <a:t>the</a:t>
+            </a:r>
+            <a:r>
+              <a:rPr lang="nl-BE" dirty="0"/>
+              <a:t> </a:t>
+            </a:r>
+            <a:r>
+              <a:rPr lang="nl-BE" dirty="0" err="1"/>
+              <a:t>need</a:t>
+            </a:r>
+            <a:r>
+              <a:rPr lang="nl-BE" dirty="0"/>
+              <a:t> of SQL skills. SQL code </a:t>
+            </a:r>
+            <a:r>
+              <a:rPr lang="nl-BE" dirty="0" err="1"/>
+              <a:t>can</a:t>
+            </a:r>
+            <a:r>
+              <a:rPr lang="nl-BE" dirty="0"/>
+              <a:t> </a:t>
+            </a:r>
+            <a:r>
+              <a:rPr lang="nl-BE" dirty="0" err="1"/>
+              <a:t>be</a:t>
+            </a:r>
+            <a:r>
+              <a:rPr lang="nl-BE" dirty="0"/>
+              <a:t> </a:t>
+            </a:r>
+            <a:r>
+              <a:rPr lang="nl-BE" dirty="0" err="1"/>
+              <a:t>managed</a:t>
+            </a:r>
+            <a:r>
+              <a:rPr lang="nl-BE" dirty="0"/>
+              <a:t> </a:t>
+            </a:r>
+            <a:r>
+              <a:rPr lang="nl-BE" dirty="0" err="1"/>
+              <a:t>by</a:t>
+            </a:r>
+            <a:r>
+              <a:rPr lang="nl-BE" dirty="0"/>
+              <a:t> </a:t>
+            </a:r>
+            <a:r>
+              <a:rPr lang="nl-BE" dirty="0" err="1"/>
+              <a:t>an</a:t>
+            </a:r>
+            <a:r>
+              <a:rPr lang="nl-BE" dirty="0"/>
+              <a:t> SQL specialist </a:t>
+            </a:r>
+            <a:r>
+              <a:rPr lang="nl-BE" dirty="0" err="1"/>
+              <a:t>and</a:t>
+            </a:r>
+            <a:r>
+              <a:rPr lang="nl-BE" dirty="0"/>
+              <a:t> no </a:t>
+            </a:r>
+            <a:r>
+              <a:rPr lang="nl-BE" dirty="0" err="1"/>
+              <a:t>PowerShell</a:t>
+            </a:r>
+            <a:r>
+              <a:rPr lang="nl-BE" dirty="0"/>
+              <a:t> skills are </a:t>
+            </a:r>
+            <a:r>
+              <a:rPr lang="nl-BE" dirty="0" err="1"/>
+              <a:t>required</a:t>
+            </a:r>
+            <a:r>
+              <a:rPr lang="nl-BE" dirty="0"/>
+              <a:t>. </a:t>
+            </a:r>
+            <a:r>
+              <a:rPr lang="nl-BE" dirty="0" err="1"/>
+              <a:t>This</a:t>
+            </a:r>
+            <a:r>
+              <a:rPr lang="nl-BE" dirty="0"/>
+              <a:t> was </a:t>
+            </a:r>
+            <a:r>
+              <a:rPr lang="nl-BE" dirty="0" err="1"/>
+              <a:t>something</a:t>
+            </a:r>
+            <a:r>
+              <a:rPr lang="nl-BE" dirty="0"/>
+              <a:t> </a:t>
+            </a:r>
+            <a:r>
+              <a:rPr lang="nl-BE" dirty="0" err="1"/>
+              <a:t>the</a:t>
+            </a:r>
+            <a:r>
+              <a:rPr lang="nl-BE" dirty="0"/>
+              <a:t> customer </a:t>
+            </a:r>
+            <a:r>
+              <a:rPr lang="nl-BE" dirty="0" err="1"/>
+              <a:t>saw</a:t>
+            </a:r>
+            <a:r>
+              <a:rPr lang="nl-BE" dirty="0"/>
+              <a:t> as a </a:t>
+            </a:r>
+            <a:r>
+              <a:rPr lang="nl-BE" dirty="0" err="1"/>
+              <a:t>huge</a:t>
+            </a:r>
+            <a:r>
+              <a:rPr lang="nl-BE" dirty="0"/>
+              <a:t> </a:t>
+            </a:r>
+            <a:r>
+              <a:rPr lang="nl-BE" dirty="0" err="1"/>
+              <a:t>improvement</a:t>
+            </a:r>
+            <a:r>
+              <a:rPr lang="nl-BE" dirty="0"/>
+              <a:t>.</a:t>
+            </a:r>
+          </a:p>
+        </p:txBody>
+      </p:sp>
+      <p:sp>
+        <p:nvSpPr>
+          <p:cNvPr id="4" name="Slide Number Placeholder 3"/>
+          <p:cNvSpPr>
+            <a:spLocks noGrp="1"/>
+          </p:cNvSpPr>
+          <p:nvPr>
+            <p:ph type="sldNum" sz="quarter" idx="5"/>
+          </p:nvPr>
+        </p:nvSpPr>
+        <p:spPr/>
+        <p:txBody>
+          <a:bodyPr/>
+          <a:lstStyle/>
+          <a:p>
+            <a:fld id="{4F5D4D40-D039-4272-86AA-C36A8296572F}" type="slidenum">
+              <a:rPr lang="nl-BE" smtClean="0"/>
+              <a:t>6</a:t>
+            </a:fld>
+            <a:endParaRPr lang="nl-BE"/>
+          </a:p>
+        </p:txBody>
+      </p:sp>
+    </p:spTree>
+    <p:extLst>
+      <p:ext uri="{BB962C8B-B14F-4D97-AF65-F5344CB8AC3E}">
+        <p14:creationId xmlns:p14="http://schemas.microsoft.com/office/powerpoint/2010/main" val="1493727108"/>
+      </p:ext>
+    </p:extLst>
+  </p:cSld>
+  <p:clrMapOvr>
+    <a:masterClrMapping/>
+  </p:clrMapOvr>
+</p:notes>
+</file>
+
+<file path=ppt/notesSlides/notesSlide7.xml><?xml version="1.0" encoding="utf-8"?>
+<p:notes xmlns:a="http://schemas.openxmlformats.org/drawingml/2006/main" xmlns:r="http://schemas.openxmlformats.org/officeDocument/2006/relationships" xmlns:p="http://schemas.openxmlformats.org/presentationml/2006/main">
+  <p:cSld>
+    <p:spTree>
+      <p:nvGrpSpPr>
+        <p:cNvPr id="1" name=""/>
+        <p:cNvGrpSpPr/>
+        <p:nvPr/>
+      </p:nvGrpSpPr>
+      <p:grpSpPr>
+        <a:xfrm>
+          <a:off x="0" y="0"/>
+          <a:ext cx="0" cy="0"/>
+          <a:chOff x="0" y="0"/>
+          <a:chExt cx="0" cy="0"/>
+        </a:xfrm>
+      </p:grpSpPr>
+      <p:sp>
+        <p:nvSpPr>
+          <p:cNvPr id="2" name="Slide Image Placeholder 1"/>
+          <p:cNvSpPr>
+            <a:spLocks noGrp="1" noRot="1" noChangeAspect="1"/>
+          </p:cNvSpPr>
+          <p:nvPr>
+            <p:ph type="sldImg"/>
+          </p:nvPr>
+        </p:nvSpPr>
+        <p:spPr/>
+      </p:sp>
+      <p:sp>
+        <p:nvSpPr>
+          <p:cNvPr id="3" name="Notes Placeholder 2"/>
+          <p:cNvSpPr>
+            <a:spLocks noGrp="1"/>
+          </p:cNvSpPr>
+          <p:nvPr>
+            <p:ph type="body" idx="1"/>
+          </p:nvPr>
+        </p:nvSpPr>
+        <p:spPr/>
+        <p:txBody>
+          <a:bodyPr/>
+          <a:lstStyle/>
+          <a:p>
+            <a:r>
+              <a:rPr lang="nl-BE" dirty="0" err="1"/>
+              <a:t>Creating</a:t>
+            </a:r>
+            <a:r>
+              <a:rPr lang="nl-BE" dirty="0"/>
+              <a:t> </a:t>
+            </a:r>
+            <a:r>
+              <a:rPr lang="nl-BE" dirty="0" err="1"/>
+              <a:t>tables</a:t>
+            </a:r>
+            <a:r>
+              <a:rPr lang="nl-BE" dirty="0"/>
+              <a:t> </a:t>
+            </a:r>
+            <a:r>
+              <a:rPr lang="nl-BE" dirty="0" err="1"/>
+              <a:t>and</a:t>
+            </a:r>
+            <a:r>
+              <a:rPr lang="nl-BE" dirty="0"/>
+              <a:t> </a:t>
+            </a:r>
+            <a:r>
+              <a:rPr lang="nl-BE" dirty="0" err="1"/>
+              <a:t>stored</a:t>
+            </a:r>
+            <a:r>
+              <a:rPr lang="nl-BE" dirty="0"/>
+              <a:t> procedures in SQL server takes a lot of time. </a:t>
+            </a:r>
+            <a:r>
+              <a:rPr lang="nl-BE" dirty="0" err="1"/>
+              <a:t>So</a:t>
+            </a:r>
+            <a:r>
+              <a:rPr lang="nl-BE" dirty="0"/>
+              <a:t> </a:t>
+            </a:r>
+            <a:r>
+              <a:rPr lang="nl-BE" dirty="0" err="1"/>
+              <a:t>this</a:t>
+            </a:r>
+            <a:r>
+              <a:rPr lang="nl-BE" dirty="0"/>
+              <a:t> approach is </a:t>
+            </a:r>
+            <a:r>
+              <a:rPr lang="nl-BE" dirty="0" err="1"/>
+              <a:t>only</a:t>
+            </a:r>
+            <a:r>
+              <a:rPr lang="nl-BE" dirty="0"/>
+              <a:t> </a:t>
+            </a:r>
+            <a:r>
+              <a:rPr lang="nl-BE" dirty="0" err="1"/>
+              <a:t>possible</a:t>
+            </a:r>
+            <a:r>
+              <a:rPr lang="nl-BE" dirty="0"/>
+              <a:t> </a:t>
+            </a:r>
+            <a:r>
+              <a:rPr lang="nl-BE" dirty="0" err="1"/>
+              <a:t>if</a:t>
+            </a:r>
+            <a:r>
+              <a:rPr lang="nl-BE" dirty="0"/>
+              <a:t> </a:t>
+            </a:r>
+            <a:r>
+              <a:rPr lang="nl-BE" dirty="0" err="1"/>
+              <a:t>you</a:t>
+            </a:r>
+            <a:r>
+              <a:rPr lang="nl-BE" dirty="0"/>
+              <a:t> are </a:t>
+            </a:r>
+            <a:r>
+              <a:rPr lang="nl-BE" dirty="0" err="1"/>
+              <a:t>talking</a:t>
+            </a:r>
+            <a:r>
+              <a:rPr lang="nl-BE" dirty="0"/>
+              <a:t> </a:t>
+            </a:r>
+            <a:r>
+              <a:rPr lang="nl-BE" dirty="0" err="1"/>
+              <a:t>about</a:t>
+            </a:r>
+            <a:r>
+              <a:rPr lang="nl-BE" dirty="0"/>
+              <a:t> </a:t>
+            </a:r>
+            <a:r>
+              <a:rPr lang="nl-BE" dirty="0" err="1"/>
+              <a:t>recurring</a:t>
+            </a:r>
+            <a:r>
+              <a:rPr lang="nl-BE" dirty="0"/>
+              <a:t> </a:t>
+            </a:r>
+            <a:r>
+              <a:rPr lang="nl-BE" dirty="0" err="1"/>
+              <a:t>tasks</a:t>
+            </a:r>
+            <a:r>
+              <a:rPr lang="nl-BE" dirty="0"/>
+              <a:t> </a:t>
+            </a:r>
+            <a:r>
+              <a:rPr lang="nl-BE" dirty="0" err="1"/>
+              <a:t>that</a:t>
+            </a:r>
+            <a:r>
+              <a:rPr lang="nl-BE" dirty="0"/>
+              <a:t> </a:t>
+            </a:r>
+            <a:r>
+              <a:rPr lang="nl-BE" dirty="0" err="1"/>
+              <a:t>need</a:t>
+            </a:r>
+            <a:r>
+              <a:rPr lang="nl-BE" dirty="0"/>
+              <a:t> </a:t>
+            </a:r>
+            <a:r>
+              <a:rPr lang="nl-BE" dirty="0" err="1"/>
+              <a:t>to</a:t>
+            </a:r>
+            <a:r>
+              <a:rPr lang="nl-BE" dirty="0"/>
+              <a:t> </a:t>
+            </a:r>
+            <a:r>
+              <a:rPr lang="nl-BE" dirty="0" err="1"/>
+              <a:t>be</a:t>
+            </a:r>
+            <a:r>
+              <a:rPr lang="nl-BE" dirty="0"/>
+              <a:t> </a:t>
+            </a:r>
+            <a:r>
+              <a:rPr lang="nl-BE" dirty="0" err="1"/>
+              <a:t>scheduled</a:t>
+            </a:r>
+            <a:r>
+              <a:rPr lang="nl-BE" dirty="0"/>
+              <a:t>.</a:t>
+            </a:r>
+          </a:p>
+        </p:txBody>
+      </p:sp>
+      <p:sp>
+        <p:nvSpPr>
+          <p:cNvPr id="4" name="Slide Number Placeholder 3"/>
+          <p:cNvSpPr>
+            <a:spLocks noGrp="1"/>
+          </p:cNvSpPr>
+          <p:nvPr>
+            <p:ph type="sldNum" sz="quarter" idx="5"/>
+          </p:nvPr>
+        </p:nvSpPr>
+        <p:spPr/>
+        <p:txBody>
+          <a:bodyPr/>
+          <a:lstStyle/>
+          <a:p>
+            <a:fld id="{4F5D4D40-D039-4272-86AA-C36A8296572F}" type="slidenum">
+              <a:rPr lang="nl-BE" smtClean="0"/>
+              <a:t>7</a:t>
+            </a:fld>
+            <a:endParaRPr lang="nl-BE"/>
+          </a:p>
+        </p:txBody>
+      </p:sp>
+    </p:spTree>
+    <p:extLst>
+      <p:ext uri="{BB962C8B-B14F-4D97-AF65-F5344CB8AC3E}">
+        <p14:creationId xmlns:p14="http://schemas.microsoft.com/office/powerpoint/2010/main" val="3503635722"/>
+      </p:ext>
+    </p:extLst>
+  </p:cSld>
+  <p:clrMapOvr>
+    <a:masterClrMapping/>
+  </p:clrMapOvr>
+</p:notes>
 </file>
 
 <file path=ppt/slideLayouts/slideLayout1.xml><?xml version="1.0" encoding="utf-8"?>
@@ -4662,13 +8222,13 @@
           <p:nvPr/>
         </p:nvPicPr>
         <p:blipFill>
-          <a:blip r:embed="rId2" cstate="print">
+          <a:blip r:embed="rId3" cstate="print">
             <a:extLst>
               <a:ext uri="{28A0092B-C50C-407E-A947-70E740481C1C}">
                 <a14:useLocalDpi xmlns:a14="http://schemas.microsoft.com/office/drawing/2010/main" val="0"/>
               </a:ext>
               <a:ext uri="{96DAC541-7B7A-43D3-8B79-37D633B846F1}">
-                <asvg:svgBlip xmlns:asvg="http://schemas.microsoft.com/office/drawing/2016/SVG/main" r:embed="rId3"/>
+                <asvg:svgBlip xmlns:asvg="http://schemas.microsoft.com/office/drawing/2016/SVG/main" r:embed="rId4"/>
               </a:ext>
             </a:extLst>
           </a:blip>
@@ -4701,13 +8261,13 @@
           <p:nvPr/>
         </p:nvPicPr>
         <p:blipFill>
-          <a:blip r:embed="rId4" cstate="print">
+          <a:blip r:embed="rId5" cstate="print">
             <a:extLst>
               <a:ext uri="{28A0092B-C50C-407E-A947-70E740481C1C}">
                 <a14:useLocalDpi xmlns:a14="http://schemas.microsoft.com/office/drawing/2010/main" val="0"/>
               </a:ext>
               <a:ext uri="{96DAC541-7B7A-43D3-8B79-37D633B846F1}">
-                <asvg:svgBlip xmlns:asvg="http://schemas.microsoft.com/office/drawing/2016/SVG/main" r:embed="rId5"/>
+                <asvg:svgBlip xmlns:asvg="http://schemas.microsoft.com/office/drawing/2016/SVG/main" r:embed="rId6"/>
               </a:ext>
             </a:extLst>
           </a:blip>
@@ -4740,7 +8300,7 @@
           <p:nvPr/>
         </p:nvPicPr>
         <p:blipFill>
-          <a:blip r:embed="rId6">
+          <a:blip r:embed="rId7">
             <a:extLst>
               <a:ext uri="{28A0092B-C50C-407E-A947-70E740481C1C}">
                 <a14:useLocalDpi xmlns:a14="http://schemas.microsoft.com/office/drawing/2010/main" val="0"/>
@@ -5642,60 +9202,6 @@
       </p:sp>
       <p:sp>
         <p:nvSpPr>
-          <p:cNvPr id="7" name="Title 2">
-            <a:extLst>
-              <a:ext uri="{FF2B5EF4-FFF2-40B4-BE49-F238E27FC236}">
-                <a16:creationId xmlns:a16="http://schemas.microsoft.com/office/drawing/2014/main" id="{0A9EEA92-8517-449C-A239-517B8228439B}"/>
-              </a:ext>
-            </a:extLst>
-          </p:cNvPr>
-          <p:cNvSpPr txBox="1">
-            <a:spLocks/>
-          </p:cNvSpPr>
-          <p:nvPr/>
-        </p:nvSpPr>
-        <p:spPr>
-          <a:xfrm>
-            <a:off x="276544" y="4587267"/>
-            <a:ext cx="7315200" cy="1036293"/>
-          </a:xfrm>
-          <a:prstGeom prst="rect">
-            <a:avLst/>
-          </a:prstGeom>
-        </p:spPr>
-        <p:txBody>
-          <a:bodyPr vert="horz" lIns="91440" tIns="45720" rIns="91440" bIns="45720" rtlCol="0" anchor="t">
-            <a:noAutofit/>
-          </a:bodyPr>
-          <a:lstStyle>
-            <a:lvl1pPr algn="l" defTabSz="914400" rtl="0" eaLnBrk="1" latinLnBrk="0" hangingPunct="1">
-              <a:lnSpc>
-                <a:spcPct val="90000"/>
-              </a:lnSpc>
-              <a:spcBef>
-                <a:spcPct val="0"/>
-              </a:spcBef>
-              <a:buNone/>
-              <a:defRPr sz="4400" kern="1200">
-                <a:solidFill>
-                  <a:srgbClr val="162332"/>
-                </a:solidFill>
-                <a:latin typeface="Segoe UI Light" panose="020B0502040204020203" pitchFamily="34" charset="0"/>
-                <a:ea typeface="+mj-ea"/>
-                <a:cs typeface="+mj-cs"/>
-              </a:defRPr>
-            </a:lvl1pPr>
-          </a:lstStyle>
-          <a:p>
-            <a:r>
-              <a:rPr lang="en-US" sz="3600" dirty="0"/>
-              <a:t>Code to process the data is more difficult to read</a:t>
-            </a:r>
-          </a:p>
-        </p:txBody>
-      </p:sp>
-      <p:sp>
-        <p:nvSpPr>
           <p:cNvPr id="9" name="Title 2">
             <a:extLst>
               <a:ext uri="{FF2B5EF4-FFF2-40B4-BE49-F238E27FC236}">
@@ -5710,7 +9216,7 @@
         </p:nvSpPr>
         <p:spPr>
           <a:xfrm>
-            <a:off x="276544" y="3137944"/>
+            <a:off x="276544" y="3655304"/>
             <a:ext cx="7315200" cy="1127731"/>
           </a:xfrm>
           <a:prstGeom prst="rect">
@@ -5741,6 +9247,10 @@
             </a:lvl1pPr>
           </a:lstStyle>
           <a:p>
+            <a:pPr marL="571500" indent="-571500">
+              <a:buFont typeface="Arial" panose="020B0604020202020204" pitchFamily="34" charset="0"/>
+              <a:buChar char="•"/>
+            </a:pPr>
             <a:r>
               <a:rPr lang="en-US" sz="3600" dirty="0"/>
               <a:t>It takes PowerShell a very long time  to process all queries</a:t>
@@ -5764,7 +9274,7 @@
         </p:nvSpPr>
         <p:spPr>
           <a:xfrm>
-            <a:off x="276544" y="1752586"/>
+            <a:off x="276544" y="2269946"/>
             <a:ext cx="7315200" cy="1036294"/>
           </a:xfrm>
           <a:prstGeom prst="rect">
@@ -5795,6 +9305,10 @@
             </a:lvl1pPr>
           </a:lstStyle>
           <a:p>
+            <a:pPr marL="571500" indent="-571500">
+              <a:buFont typeface="Arial" panose="020B0604020202020204" pitchFamily="34" charset="0"/>
+              <a:buChar char="•"/>
+            </a:pPr>
             <a:r>
               <a:rPr lang="en-US" sz="3600" dirty="0"/>
               <a:t>Complex queries are difficult to create using PowerShell</a:t>
@@ -6002,97 +9516,6 @@
                       </p:childTnLst>
                     </p:cTn>
                   </p:par>
-                  <p:par>
-                    <p:cTn id="15" fill="hold">
-                      <p:stCondLst>
-                        <p:cond delay="indefinite"/>
-                      </p:stCondLst>
-                      <p:childTnLst>
-                        <p:par>
-                          <p:cTn id="16" fill="hold">
-                            <p:stCondLst>
-                              <p:cond delay="0"/>
-                            </p:stCondLst>
-                            <p:childTnLst>
-                              <p:par>
-                                <p:cTn id="17" presetID="2" presetClass="entr" presetSubtype="4" fill="hold" grpId="0" nodeType="clickEffect">
-                                  <p:stCondLst>
-                                    <p:cond delay="0"/>
-                                  </p:stCondLst>
-                                  <p:childTnLst>
-                                    <p:set>
-                                      <p:cBhvr>
-                                        <p:cTn id="18" dur="1" fill="hold">
-                                          <p:stCondLst>
-                                            <p:cond delay="0"/>
-                                          </p:stCondLst>
-                                        </p:cTn>
-                                        <p:tgtEl>
-                                          <p:spTgt spid="7"/>
-                                        </p:tgtEl>
-                                        <p:attrNameLst>
-                                          <p:attrName>style.visibility</p:attrName>
-                                        </p:attrNameLst>
-                                      </p:cBhvr>
-                                      <p:to>
-                                        <p:strVal val="visible"/>
-                                      </p:to>
-                                    </p:set>
-                                    <p:anim calcmode="lin" valueType="num">
-                                      <p:cBhvr additive="base">
-                                        <p:cTn id="19" dur="500" fill="hold"/>
-                                        <p:tgtEl>
-                                          <p:spTgt spid="7"/>
-                                        </p:tgtEl>
-                                        <p:attrNameLst>
-                                          <p:attrName>ppt_x</p:attrName>
-                                        </p:attrNameLst>
-                                      </p:cBhvr>
-                                      <p:tavLst>
-                                        <p:tav tm="0">
-                                          <p:val>
-                                            <p:strVal val="#ppt_x"/>
-                                          </p:val>
-                                        </p:tav>
-                                        <p:tav tm="100000">
-                                          <p:val>
-                                            <p:strVal val="#ppt_x"/>
-                                          </p:val>
-                                        </p:tav>
-                                      </p:tavLst>
-                                    </p:anim>
-                                    <p:anim calcmode="lin" valueType="num">
-                                      <p:cBhvr additive="base">
-                                        <p:cTn id="20" dur="500" fill="hold"/>
-                                        <p:tgtEl>
-                                          <p:spTgt spid="7"/>
-                                        </p:tgtEl>
-                                        <p:attrNameLst>
-                                          <p:attrName>ppt_y</p:attrName>
-                                        </p:attrNameLst>
-                                      </p:cBhvr>
-                                      <p:tavLst>
-                                        <p:tav tm="0">
-                                          <p:val>
-                                            <p:strVal val="1+#ppt_h/2"/>
-                                          </p:val>
-                                        </p:tav>
-                                        <p:tav tm="100000">
-                                          <p:val>
-                                            <p:strVal val="#ppt_y"/>
-                                          </p:val>
-                                        </p:tav>
-                                      </p:tavLst>
-                                    </p:anim>
-                                  </p:childTnLst>
-                                </p:cTn>
-                              </p:par>
-                            </p:childTnLst>
-                          </p:cTn>
-                        </p:par>
-                      </p:childTnLst>
-                    </p:cTn>
-                  </p:par>
                 </p:childTnLst>
               </p:cTn>
               <p:prevCondLst>
@@ -6115,7 +9538,6 @@
       </p:par>
     </p:tnLst>
     <p:bldLst>
-      <p:bldP spid="7" grpId="0"/>
       <p:bldP spid="9" grpId="0"/>
       <p:bldP spid="11" grpId="0"/>
     </p:bldLst>
@@ -6185,7 +9607,7 @@
         </p:nvSpPr>
         <p:spPr>
           <a:xfrm>
-            <a:off x="276544" y="3133371"/>
+            <a:off x="276544" y="3506352"/>
             <a:ext cx="7315200" cy="1127733"/>
           </a:xfrm>
           <a:prstGeom prst="rect">
@@ -6239,7 +9661,7 @@
         </p:nvSpPr>
         <p:spPr>
           <a:xfrm>
-            <a:off x="276544" y="1696062"/>
+            <a:off x="276544" y="2069043"/>
             <a:ext cx="7315200" cy="1039694"/>
           </a:xfrm>
           <a:prstGeom prst="rect">
@@ -6538,7 +9960,7 @@
           <p:nvPr/>
         </p:nvPicPr>
         <p:blipFill>
-          <a:blip r:embed="rId2" cstate="print">
+          <a:blip r:embed="rId3" cstate="print">
             <a:extLst>
               <a:ext uri="{28A0092B-C50C-407E-A947-70E740481C1C}">
                 <a14:useLocalDpi xmlns:a14="http://schemas.microsoft.com/office/drawing/2010/main" val="0"/>
@@ -6574,13 +9996,13 @@
           <p:nvPr/>
         </p:nvPicPr>
         <p:blipFill>
-          <a:blip r:embed="rId3" cstate="print">
+          <a:blip r:embed="rId4" cstate="print">
             <a:extLst>
               <a:ext uri="{28A0092B-C50C-407E-A947-70E740481C1C}">
                 <a14:useLocalDpi xmlns:a14="http://schemas.microsoft.com/office/drawing/2010/main" val="0"/>
               </a:ext>
               <a:ext uri="{96DAC541-7B7A-43D3-8B79-37D633B846F1}">
-                <asvg:svgBlip xmlns:asvg="http://schemas.microsoft.com/office/drawing/2016/SVG/main" r:embed="rId4"/>
+                <asvg:svgBlip xmlns:asvg="http://schemas.microsoft.com/office/drawing/2016/SVG/main" r:embed="rId5"/>
               </a:ext>
             </a:extLst>
           </a:blip>
@@ -7595,7 +11017,7 @@
         </p:nvSpPr>
         <p:spPr>
           <a:xfrm>
-            <a:off x="276544" y="1741502"/>
+            <a:off x="276544" y="2463398"/>
             <a:ext cx="7315200" cy="550417"/>
           </a:xfrm>
           <a:prstGeom prst="rect">
@@ -7656,7 +11078,7 @@
         </p:nvSpPr>
         <p:spPr>
           <a:xfrm>
-            <a:off x="276544" y="2621870"/>
+            <a:off x="276544" y="3343766"/>
             <a:ext cx="7315200" cy="550417"/>
           </a:xfrm>
           <a:prstGeom prst="rect">
@@ -7691,67 +11113,6 @@
               <a:rPr lang="en-US" sz="3600" dirty="0"/>
               <a:t>Basic SQL knowledge is required</a:t>
             </a:r>
-          </a:p>
-        </p:txBody>
-      </p:sp>
-      <p:sp>
-        <p:nvSpPr>
-          <p:cNvPr id="8" name="Title 2">
-            <a:extLst>
-              <a:ext uri="{FF2B5EF4-FFF2-40B4-BE49-F238E27FC236}">
-                <a16:creationId xmlns:a16="http://schemas.microsoft.com/office/drawing/2014/main" id="{3D82874D-139A-4BA4-A451-638E75B085E2}"/>
-              </a:ext>
-            </a:extLst>
-          </p:cNvPr>
-          <p:cNvSpPr txBox="1">
-            <a:spLocks/>
-          </p:cNvSpPr>
-          <p:nvPr/>
-        </p:nvSpPr>
-        <p:spPr>
-          <a:xfrm>
-            <a:off x="276544" y="3502238"/>
-            <a:ext cx="7315200" cy="550417"/>
-          </a:xfrm>
-          <a:prstGeom prst="rect">
-            <a:avLst/>
-          </a:prstGeom>
-        </p:spPr>
-        <p:txBody>
-          <a:bodyPr vert="horz" lIns="91440" tIns="45720" rIns="91440" bIns="45720" rtlCol="0" anchor="t">
-            <a:noAutofit/>
-          </a:bodyPr>
-          <a:lstStyle>
-            <a:lvl1pPr algn="l" defTabSz="914400" rtl="0" eaLnBrk="1" latinLnBrk="0" hangingPunct="1">
-              <a:lnSpc>
-                <a:spcPct val="90000"/>
-              </a:lnSpc>
-              <a:spcBef>
-                <a:spcPct val="0"/>
-              </a:spcBef>
-              <a:buNone/>
-              <a:defRPr sz="4400" kern="1200">
-                <a:solidFill>
-                  <a:srgbClr val="162332"/>
-                </a:solidFill>
-                <a:latin typeface="Segoe UI Light" panose="020B0502040204020203" pitchFamily="34" charset="0"/>
-                <a:ea typeface="+mj-ea"/>
-                <a:cs typeface="+mj-cs"/>
-              </a:defRPr>
-            </a:lvl1pPr>
-          </a:lstStyle>
-          <a:p>
-            <a:r>
-              <a:rPr lang="en-US" sz="3600" dirty="0"/>
-              <a:t>Only effective for recurring tasks</a:t>
-            </a:r>
-            <a:br>
-              <a:rPr lang="en-US" sz="3600" dirty="0"/>
-            </a:br>
-            <a:br>
-              <a:rPr lang="en-US" sz="3600" dirty="0"/>
-            </a:br>
-            <a:endParaRPr lang="en-US" sz="3600" dirty="0"/>
           </a:p>
         </p:txBody>
       </p:sp>
@@ -7955,97 +11316,6 @@
                       </p:childTnLst>
                     </p:cTn>
                   </p:par>
-                  <p:par>
-                    <p:cTn id="15" fill="hold">
-                      <p:stCondLst>
-                        <p:cond delay="indefinite"/>
-                      </p:stCondLst>
-                      <p:childTnLst>
-                        <p:par>
-                          <p:cTn id="16" fill="hold">
-                            <p:stCondLst>
-                              <p:cond delay="0"/>
-                            </p:stCondLst>
-                            <p:childTnLst>
-                              <p:par>
-                                <p:cTn id="17" presetID="2" presetClass="entr" presetSubtype="4" fill="hold" grpId="0" nodeType="clickEffect">
-                                  <p:stCondLst>
-                                    <p:cond delay="0"/>
-                                  </p:stCondLst>
-                                  <p:childTnLst>
-                                    <p:set>
-                                      <p:cBhvr>
-                                        <p:cTn id="18" dur="1" fill="hold">
-                                          <p:stCondLst>
-                                            <p:cond delay="0"/>
-                                          </p:stCondLst>
-                                        </p:cTn>
-                                        <p:tgtEl>
-                                          <p:spTgt spid="8"/>
-                                        </p:tgtEl>
-                                        <p:attrNameLst>
-                                          <p:attrName>style.visibility</p:attrName>
-                                        </p:attrNameLst>
-                                      </p:cBhvr>
-                                      <p:to>
-                                        <p:strVal val="visible"/>
-                                      </p:to>
-                                    </p:set>
-                                    <p:anim calcmode="lin" valueType="num">
-                                      <p:cBhvr additive="base">
-                                        <p:cTn id="19" dur="500" fill="hold"/>
-                                        <p:tgtEl>
-                                          <p:spTgt spid="8"/>
-                                        </p:tgtEl>
-                                        <p:attrNameLst>
-                                          <p:attrName>ppt_x</p:attrName>
-                                        </p:attrNameLst>
-                                      </p:cBhvr>
-                                      <p:tavLst>
-                                        <p:tav tm="0">
-                                          <p:val>
-                                            <p:strVal val="#ppt_x"/>
-                                          </p:val>
-                                        </p:tav>
-                                        <p:tav tm="100000">
-                                          <p:val>
-                                            <p:strVal val="#ppt_x"/>
-                                          </p:val>
-                                        </p:tav>
-                                      </p:tavLst>
-                                    </p:anim>
-                                    <p:anim calcmode="lin" valueType="num">
-                                      <p:cBhvr additive="base">
-                                        <p:cTn id="20" dur="500" fill="hold"/>
-                                        <p:tgtEl>
-                                          <p:spTgt spid="8"/>
-                                        </p:tgtEl>
-                                        <p:attrNameLst>
-                                          <p:attrName>ppt_y</p:attrName>
-                                        </p:attrNameLst>
-                                      </p:cBhvr>
-                                      <p:tavLst>
-                                        <p:tav tm="0">
-                                          <p:val>
-                                            <p:strVal val="1+#ppt_h/2"/>
-                                          </p:val>
-                                        </p:tav>
-                                        <p:tav tm="100000">
-                                          <p:val>
-                                            <p:strVal val="#ppt_y"/>
-                                          </p:val>
-                                        </p:tav>
-                                      </p:tavLst>
-                                    </p:anim>
-                                  </p:childTnLst>
-                                </p:cTn>
-                              </p:par>
-                            </p:childTnLst>
-                          </p:cTn>
-                        </p:par>
-                      </p:childTnLst>
-                    </p:cTn>
-                  </p:par>
                 </p:childTnLst>
               </p:cTn>
               <p:prevCondLst>
@@ -8070,7 +11340,6 @@
     <p:bldLst>
       <p:bldP spid="6" grpId="0"/>
       <p:bldP spid="7" grpId="0"/>
-      <p:bldP spid="8" grpId="0"/>
     </p:bldLst>
   </p:timing>
 </p:sld>
@@ -8132,9 +11401,12 @@
             <a:br>
               <a:rPr lang="en-US" sz="3600" dirty="0"/>
             </a:br>
+            <a:br>
+              <a:rPr lang="en-US" sz="3600" dirty="0"/>
+            </a:br>
             <a:r>
               <a:rPr lang="en-US" sz="3600" b="1" dirty="0"/>
-              <a:t>Combine user with persons</a:t>
+              <a:t>Combine users with persons</a:t>
             </a:r>
             <a:br>
               <a:rPr lang="en-US" sz="3600" dirty="0"/>
@@ -8188,7 +11460,7 @@
         </p:nvSpPr>
         <p:spPr>
           <a:xfrm>
-            <a:off x="276544" y="2755639"/>
+            <a:off x="276544" y="2033741"/>
             <a:ext cx="7315200" cy="1393826"/>
           </a:xfrm>
         </p:spPr>
@@ -8219,7 +11491,7 @@
         </p:nvSpPr>
         <p:spPr>
           <a:xfrm>
-            <a:off x="276544" y="918345"/>
+            <a:off x="276544" y="196447"/>
             <a:ext cx="7315200" cy="1837294"/>
           </a:xfrm>
         </p:spPr>
@@ -8271,8 +11543,8 @@
         </p:nvSpPr>
         <p:spPr>
           <a:xfrm>
-            <a:off x="276544" y="3636008"/>
-            <a:ext cx="7315200" cy="1393826"/>
+            <a:off x="276544" y="2914109"/>
+            <a:ext cx="7315200" cy="2668539"/>
           </a:xfrm>
           <a:prstGeom prst="rect">
             <a:avLst/>
@@ -8280,7 +11552,7 @@
         </p:spPr>
         <p:txBody>
           <a:bodyPr vert="horz" lIns="91440" tIns="45720" rIns="91440" bIns="45720" rtlCol="0">
-            <a:normAutofit fontScale="70000" lnSpcReduction="20000"/>
+            <a:normAutofit fontScale="92500" lnSpcReduction="10000"/>
           </a:bodyPr>
           <a:lstStyle>
             <a:lvl1pPr marL="228600" indent="-228600" algn="l" defTabSz="914400" rtl="0" eaLnBrk="1" latinLnBrk="0" hangingPunct="1">
@@ -8489,6 +11761,49 @@
               <a:rPr lang="fr-BE" dirty="0" err="1"/>
               <a:t>cvangeendert</a:t>
             </a:r>
+            <a:endParaRPr lang="fr-BE" dirty="0"/>
+          </a:p>
+          <a:p>
+            <a:pPr marL="0" indent="0">
+              <a:buNone/>
+            </a:pPr>
+            <a:endParaRPr lang="fr-BE" dirty="0"/>
+          </a:p>
+          <a:p>
+            <a:pPr marL="0" indent="0">
+              <a:buNone/>
+            </a:pPr>
+            <a:r>
+              <a:rPr lang="fr-BE" dirty="0" err="1"/>
+              <a:t>Additional</a:t>
+            </a:r>
+            <a:r>
+              <a:rPr lang="fr-BE" dirty="0"/>
+              <a:t> </a:t>
+            </a:r>
+            <a:r>
+              <a:rPr lang="fr-BE" dirty="0" err="1"/>
+              <a:t>tools</a:t>
+            </a:r>
+            <a:r>
+              <a:rPr lang="fr-BE" dirty="0"/>
+              <a:t>: </a:t>
+            </a:r>
+            <a:r>
+              <a:rPr lang="fr-BE" dirty="0">
+                <a:hlinkClick r:id="rId3"/>
+              </a:rPr>
+              <a:t>https://dbatools.io/</a:t>
+            </a:r>
+            <a:r>
+              <a:rPr lang="fr-BE" dirty="0"/>
+              <a:t> by @cl</a:t>
+            </a:r>
+          </a:p>
+          <a:p>
+            <a:pPr marL="0" indent="0">
+              <a:buNone/>
+            </a:pPr>
             <a:endParaRPr lang="en-US" dirty="0"/>
           </a:p>
         </p:txBody>
@@ -9026,4 +12341,299 @@
     </a:ext>
   </a:extLst>
 </a:theme>
+</file>
+
+<file path=ppt/theme/theme3.xml><?xml version="1.0" encoding="utf-8"?>
+<a:theme xmlns:a="http://schemas.openxmlformats.org/drawingml/2006/main" name="Office Theme">
+  <a:themeElements>
+    <a:clrScheme name="Office">
+      <a:dk1>
+        <a:sysClr val="windowText" lastClr="000000"/>
+      </a:dk1>
+      <a:lt1>
+        <a:sysClr val="window" lastClr="FFFFFF"/>
+      </a:lt1>
+      <a:dk2>
+        <a:srgbClr val="44546A"/>
+      </a:dk2>
+      <a:lt2>
+        <a:srgbClr val="E7E6E6"/>
+      </a:lt2>
+      <a:accent1>
+        <a:srgbClr val="4472C4"/>
+      </a:accent1>
+      <a:accent2>
+        <a:srgbClr val="ED7D31"/>
+      </a:accent2>
+      <a:accent3>
+        <a:srgbClr val="A5A5A5"/>
+      </a:accent3>
+      <a:accent4>
+        <a:srgbClr val="FFC000"/>
+      </a:accent4>
+      <a:accent5>
+        <a:srgbClr val="5B9BD5"/>
+      </a:accent5>
+      <a:accent6>
+        <a:srgbClr val="70AD47"/>
+      </a:accent6>
+      <a:hlink>
+        <a:srgbClr val="0563C1"/>
+      </a:hlink>
+      <a:folHlink>
+        <a:srgbClr val="954F72"/>
+      </a:folHlink>
+    </a:clrScheme>
+    <a:fontScheme name="Office">
+      <a:majorFont>
+        <a:latin typeface="Calibri Light" panose="020F0302020204030204"/>
+        <a:ea typeface=""/>
+        <a:cs typeface=""/>
+        <a:font script="Jpan" typeface="游ゴシック Light"/>
+        <a:font script="Hang" typeface="맑은 고딕"/>
+        <a:font script="Hans" typeface="等线 Light"/>
+        <a:font script="Hant" typeface="新細明體"/>
+        <a:font script="Arab" typeface="Times New Roman"/>
+        <a:font script="Hebr" typeface="Times New Roman"/>
+        <a:font script="Thai" typeface="Angsana New"/>
+        <a:font script="Ethi" typeface="Nyala"/>
+        <a:font script="Beng" typeface="Vrinda"/>
+        <a:font script="Gujr" typeface="Shruti"/>
+        <a:font script="Khmr" typeface="MoolBoran"/>
+        <a:font script="Knda" typeface="Tunga"/>
+        <a:font script="Guru" typeface="Raavi"/>
+        <a:font script="Cans" typeface="Euphemia"/>
+        <a:font script="Cher" typeface="Plantagenet Cherokee"/>
+        <a:font script="Yiii" typeface="Microsoft Yi Baiti"/>
+        <a:font script="Tibt" typeface="Microsoft Himalaya"/>
+        <a:font script="Thaa" typeface="MV Boli"/>
+        <a:font script="Deva" typeface="Mangal"/>
+        <a:font script="Telu" typeface="Gautami"/>
+        <a:font script="Taml" typeface="Latha"/>
+        <a:font script="Syrc" typeface="Estrangelo Edessa"/>
+        <a:font script="Orya" typeface="Kalinga"/>
+        <a:font script="Mlym" typeface="Kartika"/>
+        <a:font script="Laoo" typeface="DokChampa"/>
+        <a:font script="Sinh" typeface="Iskoola Pota"/>
+        <a:font script="Mong" typeface="Mongolian Baiti"/>
+        <a:font script="Viet" typeface="Times New Roman"/>
+        <a:font script="Uigh" typeface="Microsoft Uighur"/>
+        <a:font script="Geor" typeface="Sylfaen"/>
+        <a:font script="Armn" typeface="Arial"/>
+        <a:font script="Bugi" typeface="Leelawadee UI"/>
+        <a:font script="Bopo" typeface="Microsoft JhengHei"/>
+        <a:font script="Java" typeface="Javanese Text"/>
+        <a:font script="Lisu" typeface="Segoe UI"/>
+        <a:font script="Mymr" typeface="Myanmar Text"/>
+        <a:font script="Nkoo" typeface="Ebrima"/>
+        <a:font script="Olck" typeface="Nirmala UI"/>
+        <a:font script="Osma" typeface="Ebrima"/>
+        <a:font script="Phag" typeface="Phagspa"/>
+        <a:font script="Syrn" typeface="Estrangelo Edessa"/>
+        <a:font script="Syrj" typeface="Estrangelo Edessa"/>
+        <a:font script="Syre" typeface="Estrangelo Edessa"/>
+        <a:font script="Sora" typeface="Nirmala UI"/>
+        <a:font script="Tale" typeface="Microsoft Tai Le"/>
+        <a:font script="Talu" typeface="Microsoft New Tai Lue"/>
+        <a:font script="Tfng" typeface="Ebrima"/>
+      </a:majorFont>
+      <a:minorFont>
+        <a:latin typeface="Calibri" panose="020F0502020204030204"/>
+        <a:ea typeface=""/>
+        <a:cs typeface=""/>
+        <a:font script="Jpan" typeface="游ゴシック"/>
+        <a:font script="Hang" typeface="맑은 고딕"/>
+        <a:font script="Hans" typeface="等线"/>
+        <a:font script="Hant" typeface="新細明體"/>
+        <a:font script="Arab" typeface="Arial"/>
+        <a:font script="Hebr" typeface="Arial"/>
+        <a:font script="Thai" typeface="Cordia New"/>
+        <a:font script="Ethi" typeface="Nyala"/>
+        <a:font script="Beng" typeface="Vrinda"/>
+        <a:font script="Gujr" typeface="Shruti"/>
+        <a:font script="Khmr" typeface="DaunPenh"/>
+        <a:font script="Knda" typeface="Tunga"/>
+        <a:font script="Guru" typeface="Raavi"/>
+        <a:font script="Cans" typeface="Euphemia"/>
+        <a:font script="Cher" typeface="Plantagenet Cherokee"/>
+        <a:font script="Yiii" typeface="Microsoft Yi Baiti"/>
+        <a:font script="Tibt" typeface="Microsoft Himalaya"/>
+        <a:font script="Thaa" typeface="MV Boli"/>
+        <a:font script="Deva" typeface="Mangal"/>
+        <a:font script="Telu" typeface="Gautami"/>
+        <a:font script="Taml" typeface="Latha"/>
+        <a:font script="Syrc" typeface="Estrangelo Edessa"/>
+        <a:font script="Orya" typeface="Kalinga"/>
+        <a:font script="Mlym" typeface="Kartika"/>
+        <a:font script="Laoo" typeface="DokChampa"/>
+        <a:font script="Sinh" typeface="Iskoola Pota"/>
+        <a:font script="Mong" typeface="Mongolian Baiti"/>
+        <a:font script="Viet" typeface="Arial"/>
+        <a:font script="Uigh" typeface="Microsoft Uighur"/>
+        <a:font script="Geor" typeface="Sylfaen"/>
+        <a:font script="Armn" typeface="Arial"/>
+        <a:font script="Bugi" typeface="Leelawadee UI"/>
+        <a:font script="Bopo" typeface="Microsoft JhengHei"/>
+        <a:font script="Java" typeface="Javanese Text"/>
+        <a:font script="Lisu" typeface="Segoe UI"/>
+        <a:font script="Mymr" typeface="Myanmar Text"/>
+        <a:font script="Nkoo" typeface="Ebrima"/>
+        <a:font script="Olck" typeface="Nirmala UI"/>
+        <a:font script="Osma" typeface="Ebrima"/>
+        <a:font script="Phag" typeface="Phagspa"/>
+        <a:font script="Syrn" typeface="Estrangelo Edessa"/>
+        <a:font script="Syrj" typeface="Estrangelo Edessa"/>
+        <a:font script="Syre" typeface="Estrangelo Edessa"/>
+        <a:font script="Sora" typeface="Nirmala UI"/>
+        <a:font script="Tale" typeface="Microsoft Tai Le"/>
+        <a:font script="Talu" typeface="Microsoft New Tai Lue"/>
+        <a:font script="Tfng" typeface="Ebrima"/>
+      </a:minorFont>
+    </a:fontScheme>
+    <a:fmtScheme name="Office">
+      <a:fillStyleLst>
+        <a:solidFill>
+          <a:schemeClr val="phClr"/>
+        </a:solidFill>
+        <a:gradFill rotWithShape="1">
+          <a:gsLst>
+            <a:gs pos="0">
+              <a:schemeClr val="phClr">
+                <a:lumMod val="110000"/>
+                <a:satMod val="105000"/>
+                <a:tint val="67000"/>
+              </a:schemeClr>
+            </a:gs>
+            <a:gs pos="50000">
+              <a:schemeClr val="phClr">
+                <a:lumMod val="105000"/>
+                <a:satMod val="103000"/>
+                <a:tint val="73000"/>
+              </a:schemeClr>
+            </a:gs>
+            <a:gs pos="100000">
+              <a:schemeClr val="phClr">
+                <a:lumMod val="105000"/>
+                <a:satMod val="109000"/>
+                <a:tint val="81000"/>
+              </a:schemeClr>
+            </a:gs>
+          </a:gsLst>
+          <a:lin ang="5400000" scaled="0"/>
+        </a:gradFill>
+        <a:gradFill rotWithShape="1">
+          <a:gsLst>
+            <a:gs pos="0">
+              <a:schemeClr val="phClr">
+                <a:satMod val="103000"/>
+                <a:lumMod val="102000"/>
+                <a:tint val="94000"/>
+              </a:schemeClr>
+            </a:gs>
+            <a:gs pos="50000">
+              <a:schemeClr val="phClr">
+                <a:satMod val="110000"/>
+                <a:lumMod val="100000"/>
+                <a:shade val="100000"/>
+              </a:schemeClr>
+            </a:gs>
+            <a:gs pos="100000">
+              <a:schemeClr val="phClr">
+                <a:lumMod val="99000"/>
+                <a:satMod val="120000"/>
+                <a:shade val="78000"/>
+              </a:schemeClr>
+            </a:gs>
+          </a:gsLst>
+          <a:lin ang="5400000" scaled="0"/>
+        </a:gradFill>
+      </a:fillStyleLst>
+      <a:lnStyleLst>
+        <a:ln w="6350" cap="flat" cmpd="sng" algn="ctr">
+          <a:solidFill>
+            <a:schemeClr val="phClr"/>
+          </a:solidFill>
+          <a:prstDash val="solid"/>
+          <a:miter lim="800000"/>
+        </a:ln>
+        <a:ln w="12700" cap="flat" cmpd="sng" algn="ctr">
+          <a:solidFill>
+            <a:schemeClr val="phClr"/>
+          </a:solidFill>
+          <a:prstDash val="solid"/>
+          <a:miter lim="800000"/>
+        </a:ln>
+        <a:ln w="19050" cap="flat" cmpd="sng" algn="ctr">
+          <a:solidFill>
+            <a:schemeClr val="phClr"/>
+          </a:solidFill>
+          <a:prstDash val="solid"/>
+          <a:miter lim="800000"/>
+        </a:ln>
+      </a:lnStyleLst>
+      <a:effectStyleLst>
+        <a:effectStyle>
+          <a:effectLst/>
+        </a:effectStyle>
+        <a:effectStyle>
+          <a:effectLst/>
+        </a:effectStyle>
+        <a:effectStyle>
+          <a:effectLst>
+            <a:outerShdw blurRad="57150" dist="19050" dir="5400000" algn="ctr" rotWithShape="0">
+              <a:srgbClr val="000000">
+                <a:alpha val="63000"/>
+              </a:srgbClr>
+            </a:outerShdw>
+          </a:effectLst>
+        </a:effectStyle>
+      </a:effectStyleLst>
+      <a:bgFillStyleLst>
+        <a:solidFill>
+          <a:schemeClr val="phClr"/>
+        </a:solidFill>
+        <a:solidFill>
+          <a:schemeClr val="phClr">
+            <a:tint val="95000"/>
+            <a:satMod val="170000"/>
+          </a:schemeClr>
+        </a:solidFill>
+        <a:gradFill rotWithShape="1">
+          <a:gsLst>
+            <a:gs pos="0">
+              <a:schemeClr val="phClr">
+                <a:tint val="93000"/>
+                <a:satMod val="150000"/>
+                <a:shade val="98000"/>
+                <a:lumMod val="102000"/>
+              </a:schemeClr>
+            </a:gs>
+            <a:gs pos="50000">
+              <a:schemeClr val="phClr">
+                <a:tint val="98000"/>
+                <a:satMod val="130000"/>
+                <a:shade val="90000"/>
+                <a:lumMod val="103000"/>
+              </a:schemeClr>
+            </a:gs>
+            <a:gs pos="100000">
+              <a:schemeClr val="phClr">
+                <a:shade val="63000"/>
+                <a:satMod val="120000"/>
+              </a:schemeClr>
+            </a:gs>
+          </a:gsLst>
+          <a:lin ang="5400000" scaled="0"/>
+        </a:gradFill>
+      </a:bgFillStyleLst>
+    </a:fmtScheme>
+  </a:themeElements>
+  <a:objectDefaults/>
+  <a:extraClrSchemeLst/>
+  <a:extLst>
+    <a:ext uri="{05A4C25C-085E-4340-85A3-A5531E510DB2}">
+      <thm15:themeFamily xmlns:thm15="http://schemas.microsoft.com/office/thememl/2012/main" name="Office Theme" id="{62F939B6-93AF-4DB8-9C6B-D6C7DFDC589F}" vid="{4A3C46E8-61CC-4603-A589-7422A47A8E4A}"/>
+    </a:ext>
+  </a:extLst>
+</a:theme>
 </file>
</xml_diff>